<commit_message>
Script & function documentation, added tags to objects in 3D wall figures.
</commit_message>
<xml_diff>
--- a/computer_vision/background/data/Ri078 & Ri080 Label Conventions.pptx
+++ b/computer_vision/background/data/Ri078 & Ri080 Label Conventions.pptx
@@ -249,7 +249,7 @@
           <a:p>
             <a:fld id="{E3B7421E-21E2-4B7B-9A91-4819AC3BC007}" type="datetimeFigureOut">
               <a:rPr lang="en-US" smtClean="0"/>
-              <a:t>3/18/2020</a:t>
+              <a:t>3/19/2020</a:t>
             </a:fld>
             <a:endParaRPr lang="en-US"/>
           </a:p>
@@ -419,7 +419,7 @@
           <a:p>
             <a:fld id="{E3B7421E-21E2-4B7B-9A91-4819AC3BC007}" type="datetimeFigureOut">
               <a:rPr lang="en-US" smtClean="0"/>
-              <a:t>3/18/2020</a:t>
+              <a:t>3/19/2020</a:t>
             </a:fld>
             <a:endParaRPr lang="en-US"/>
           </a:p>
@@ -599,7 +599,7 @@
           <a:p>
             <a:fld id="{E3B7421E-21E2-4B7B-9A91-4819AC3BC007}" type="datetimeFigureOut">
               <a:rPr lang="en-US" smtClean="0"/>
-              <a:t>3/18/2020</a:t>
+              <a:t>3/19/2020</a:t>
             </a:fld>
             <a:endParaRPr lang="en-US"/>
           </a:p>
@@ -769,7 +769,7 @@
           <a:p>
             <a:fld id="{E3B7421E-21E2-4B7B-9A91-4819AC3BC007}" type="datetimeFigureOut">
               <a:rPr lang="en-US" smtClean="0"/>
-              <a:t>3/18/2020</a:t>
+              <a:t>3/19/2020</a:t>
             </a:fld>
             <a:endParaRPr lang="en-US"/>
           </a:p>
@@ -1015,7 +1015,7 @@
           <a:p>
             <a:fld id="{E3B7421E-21E2-4B7B-9A91-4819AC3BC007}" type="datetimeFigureOut">
               <a:rPr lang="en-US" smtClean="0"/>
-              <a:t>3/18/2020</a:t>
+              <a:t>3/19/2020</a:t>
             </a:fld>
             <a:endParaRPr lang="en-US"/>
           </a:p>
@@ -1247,7 +1247,7 @@
           <a:p>
             <a:fld id="{E3B7421E-21E2-4B7B-9A91-4819AC3BC007}" type="datetimeFigureOut">
               <a:rPr lang="en-US" smtClean="0"/>
-              <a:t>3/18/2020</a:t>
+              <a:t>3/19/2020</a:t>
             </a:fld>
             <a:endParaRPr lang="en-US"/>
           </a:p>
@@ -1614,7 +1614,7 @@
           <a:p>
             <a:fld id="{E3B7421E-21E2-4B7B-9A91-4819AC3BC007}" type="datetimeFigureOut">
               <a:rPr lang="en-US" smtClean="0"/>
-              <a:t>3/18/2020</a:t>
+              <a:t>3/19/2020</a:t>
             </a:fld>
             <a:endParaRPr lang="en-US"/>
           </a:p>
@@ -1732,7 +1732,7 @@
           <a:p>
             <a:fld id="{E3B7421E-21E2-4B7B-9A91-4819AC3BC007}" type="datetimeFigureOut">
               <a:rPr lang="en-US" smtClean="0"/>
-              <a:t>3/18/2020</a:t>
+              <a:t>3/19/2020</a:t>
             </a:fld>
             <a:endParaRPr lang="en-US"/>
           </a:p>
@@ -1827,7 +1827,7 @@
           <a:p>
             <a:fld id="{E3B7421E-21E2-4B7B-9A91-4819AC3BC007}" type="datetimeFigureOut">
               <a:rPr lang="en-US" smtClean="0"/>
-              <a:t>3/18/2020</a:t>
+              <a:t>3/19/2020</a:t>
             </a:fld>
             <a:endParaRPr lang="en-US"/>
           </a:p>
@@ -2104,7 +2104,7 @@
           <a:p>
             <a:fld id="{E3B7421E-21E2-4B7B-9A91-4819AC3BC007}" type="datetimeFigureOut">
               <a:rPr lang="en-US" smtClean="0"/>
-              <a:t>3/18/2020</a:t>
+              <a:t>3/19/2020</a:t>
             </a:fld>
             <a:endParaRPr lang="en-US"/>
           </a:p>
@@ -2357,7 +2357,7 @@
           <a:p>
             <a:fld id="{E3B7421E-21E2-4B7B-9A91-4819AC3BC007}" type="datetimeFigureOut">
               <a:rPr lang="en-US" smtClean="0"/>
-              <a:t>3/18/2020</a:t>
+              <a:t>3/19/2020</a:t>
             </a:fld>
             <a:endParaRPr lang="en-US"/>
           </a:p>
@@ -2570,7 +2570,7 @@
           <a:p>
             <a:fld id="{E3B7421E-21E2-4B7B-9A91-4819AC3BC007}" type="datetimeFigureOut">
               <a:rPr lang="en-US" smtClean="0"/>
-              <a:t>3/18/2020</a:t>
+              <a:t>3/19/2020</a:t>
             </a:fld>
             <a:endParaRPr lang="en-US"/>
           </a:p>
@@ -6024,8 +6024,8 @@
           </p:sp>
         </mc:Fallback>
       </mc:AlternateContent>
-      <mc:AlternateContent xmlns:mc="http://schemas.openxmlformats.org/markup-compatibility/2006">
-        <mc:Choice xmlns:a14="http://schemas.microsoft.com/office/drawing/2010/main" Requires="a14">
+      <mc:AlternateContent xmlns:mc="http://schemas.openxmlformats.org/markup-compatibility/2006" xmlns:a14="http://schemas.microsoft.com/office/drawing/2010/main">
+        <mc:Choice Requires="a14">
           <p:sp>
             <p:nvSpPr>
               <p:cNvPr id="17" name="TextBox 16"/>
@@ -6088,7 +6088,7 @@
             </p:txBody>
           </p:sp>
         </mc:Choice>
-        <mc:Fallback>
+        <mc:Fallback xmlns="">
           <p:sp>
             <p:nvSpPr>
               <p:cNvPr id="17" name="TextBox 16"/>
@@ -6215,8 +6215,8 @@
             </a:fontRef>
           </p:style>
         </p:cxnSp>
-        <mc:AlternateContent xmlns:mc="http://schemas.openxmlformats.org/markup-compatibility/2006">
-          <mc:Choice xmlns:a14="http://schemas.microsoft.com/office/drawing/2010/main" Requires="a14">
+        <mc:AlternateContent xmlns:mc="http://schemas.openxmlformats.org/markup-compatibility/2006" xmlns:a14="http://schemas.microsoft.com/office/drawing/2010/main">
+          <mc:Choice Requires="a14">
             <p:sp>
               <p:nvSpPr>
                 <p:cNvPr id="20" name="TextBox 19"/>
@@ -6279,7 +6279,7 @@
               </p:txBody>
             </p:sp>
           </mc:Choice>
-          <mc:Fallback>
+          <mc:Fallback xmlns="">
             <p:sp>
               <p:nvSpPr>
                 <p:cNvPr id="20" name="TextBox 19"/>
@@ -6586,8 +6586,8 @@
           </p:style>
         </p:cxnSp>
       </p:grpSp>
-      <mc:AlternateContent xmlns:mc="http://schemas.openxmlformats.org/markup-compatibility/2006">
-        <mc:Choice xmlns:a14="http://schemas.microsoft.com/office/drawing/2010/main" Requires="a14">
+      <mc:AlternateContent xmlns:mc="http://schemas.openxmlformats.org/markup-compatibility/2006" xmlns:a14="http://schemas.microsoft.com/office/drawing/2010/main">
+        <mc:Choice Requires="a14">
           <p:sp>
             <p:nvSpPr>
               <p:cNvPr id="32" name="TextBox 31"/>
@@ -6650,7 +6650,7 @@
             </p:txBody>
           </p:sp>
         </mc:Choice>
-        <mc:Fallback>
+        <mc:Fallback xmlns="">
           <p:sp>
             <p:nvSpPr>
               <p:cNvPr id="32" name="TextBox 31"/>
@@ -6689,8 +6689,8 @@
           </p:sp>
         </mc:Fallback>
       </mc:AlternateContent>
-      <mc:AlternateContent xmlns:mc="http://schemas.openxmlformats.org/markup-compatibility/2006">
-        <mc:Choice xmlns:a14="http://schemas.microsoft.com/office/drawing/2010/main" Requires="a14">
+      <mc:AlternateContent xmlns:mc="http://schemas.openxmlformats.org/markup-compatibility/2006" xmlns:a14="http://schemas.microsoft.com/office/drawing/2010/main">
+        <mc:Choice Requires="a14">
           <p:sp>
             <p:nvSpPr>
               <p:cNvPr id="33" name="TextBox 32"/>
@@ -6753,7 +6753,7 @@
             </p:txBody>
           </p:sp>
         </mc:Choice>
-        <mc:Fallback>
+        <mc:Fallback xmlns="">
           <p:sp>
             <p:nvSpPr>
               <p:cNvPr id="33" name="TextBox 32"/>
@@ -6792,8 +6792,8 @@
           </p:sp>
         </mc:Fallback>
       </mc:AlternateContent>
-      <mc:AlternateContent xmlns:mc="http://schemas.openxmlformats.org/markup-compatibility/2006">
-        <mc:Choice xmlns:a14="http://schemas.microsoft.com/office/drawing/2010/main" Requires="a14">
+      <mc:AlternateContent xmlns:mc="http://schemas.openxmlformats.org/markup-compatibility/2006" xmlns:a14="http://schemas.microsoft.com/office/drawing/2010/main">
+        <mc:Choice Requires="a14">
           <p:sp>
             <p:nvSpPr>
               <p:cNvPr id="34" name="TextBox 33"/>
@@ -6856,7 +6856,7 @@
             </p:txBody>
           </p:sp>
         </mc:Choice>
-        <mc:Fallback>
+        <mc:Fallback xmlns="">
           <p:sp>
             <p:nvSpPr>
               <p:cNvPr id="34" name="TextBox 33"/>
@@ -7170,6 +7170,126 @@
               <a:t>Width</a:t>
             </a:r>
             <a:endParaRPr lang="en-US" u="sng" dirty="0"/>
+          </a:p>
+        </p:txBody>
+      </p:sp>
+      <p:sp>
+        <p:nvSpPr>
+          <p:cNvPr id="11" name="TextBox 10"/>
+          <p:cNvSpPr txBox="1"/>
+          <p:nvPr/>
+        </p:nvSpPr>
+        <p:spPr>
+          <a:xfrm>
+            <a:off x="2146009" y="1246996"/>
+            <a:ext cx="301686" cy="369332"/>
+          </a:xfrm>
+          <a:prstGeom prst="rect">
+            <a:avLst/>
+          </a:prstGeom>
+          <a:noFill/>
+        </p:spPr>
+        <p:txBody>
+          <a:bodyPr wrap="none" rtlCol="0">
+            <a:spAutoFit/>
+          </a:bodyPr>
+          <a:lstStyle/>
+          <a:p>
+            <a:r>
+              <a:rPr lang="en-US" dirty="0" smtClean="0"/>
+              <a:t>2</a:t>
+            </a:r>
+            <a:endParaRPr lang="en-US" dirty="0"/>
+          </a:p>
+        </p:txBody>
+      </p:sp>
+      <p:sp>
+        <p:nvSpPr>
+          <p:cNvPr id="43" name="TextBox 42"/>
+          <p:cNvSpPr txBox="1"/>
+          <p:nvPr/>
+        </p:nvSpPr>
+        <p:spPr>
+          <a:xfrm>
+            <a:off x="10125342" y="1366778"/>
+            <a:ext cx="301686" cy="369332"/>
+          </a:xfrm>
+          <a:prstGeom prst="rect">
+            <a:avLst/>
+          </a:prstGeom>
+          <a:noFill/>
+        </p:spPr>
+        <p:txBody>
+          <a:bodyPr wrap="none" rtlCol="0">
+            <a:spAutoFit/>
+          </a:bodyPr>
+          <a:lstStyle/>
+          <a:p>
+            <a:r>
+              <a:rPr lang="en-US" dirty="0" smtClean="0"/>
+              <a:t>1</a:t>
+            </a:r>
+            <a:endParaRPr lang="en-US" dirty="0"/>
+          </a:p>
+        </p:txBody>
+      </p:sp>
+      <p:sp>
+        <p:nvSpPr>
+          <p:cNvPr id="44" name="TextBox 43"/>
+          <p:cNvSpPr txBox="1"/>
+          <p:nvPr/>
+        </p:nvSpPr>
+        <p:spPr>
+          <a:xfrm>
+            <a:off x="2292038" y="6198113"/>
+            <a:ext cx="301686" cy="369332"/>
+          </a:xfrm>
+          <a:prstGeom prst="rect">
+            <a:avLst/>
+          </a:prstGeom>
+          <a:noFill/>
+        </p:spPr>
+        <p:txBody>
+          <a:bodyPr wrap="none" rtlCol="0">
+            <a:spAutoFit/>
+          </a:bodyPr>
+          <a:lstStyle/>
+          <a:p>
+            <a:r>
+              <a:rPr lang="en-US" dirty="0" smtClean="0"/>
+              <a:t>3</a:t>
+            </a:r>
+            <a:endParaRPr lang="en-US" dirty="0"/>
+          </a:p>
+        </p:txBody>
+      </p:sp>
+      <p:sp>
+        <p:nvSpPr>
+          <p:cNvPr id="45" name="TextBox 44"/>
+          <p:cNvSpPr txBox="1"/>
+          <p:nvPr/>
+        </p:nvSpPr>
+        <p:spPr>
+          <a:xfrm>
+            <a:off x="9823656" y="6084482"/>
+            <a:ext cx="301686" cy="369332"/>
+          </a:xfrm>
+          <a:prstGeom prst="rect">
+            <a:avLst/>
+          </a:prstGeom>
+          <a:noFill/>
+        </p:spPr>
+        <p:txBody>
+          <a:bodyPr wrap="none" rtlCol="0">
+            <a:spAutoFit/>
+          </a:bodyPr>
+          <a:lstStyle/>
+          <a:p>
+            <a:r>
+              <a:rPr lang="en-US" smtClean="0"/>
+              <a:t>4</a:t>
+            </a:r>
+            <a:endParaRPr lang="en-US" dirty="0"/>
           </a:p>
         </p:txBody>
       </p:sp>

</xml_diff>

<commit_message>
Camera FOV figures with lights and tags.
</commit_message>
<xml_diff>
--- a/computer_vision/background/data/Ri078 & Ri080 Label Conventions.pptx
+++ b/computer_vision/background/data/Ri078 & Ri080 Label Conventions.pptx
@@ -12,6 +12,8 @@
     <p:sldId id="262" r:id="rId6"/>
     <p:sldId id="263" r:id="rId7"/>
     <p:sldId id="264" r:id="rId8"/>
+    <p:sldId id="265" r:id="rId9"/>
+    <p:sldId id="266" r:id="rId10"/>
   </p:sldIdLst>
   <p:sldSz cx="12192000" cy="6858000"/>
   <p:notesSz cx="6858000" cy="9144000"/>
@@ -7306,6 +7308,4557 @@
 </p:sld>
 </file>
 
+<file path=ppt/slides/slide8.xml><?xml version="1.0" encoding="utf-8"?>
+<p:sld xmlns:a="http://schemas.openxmlformats.org/drawingml/2006/main" xmlns:r="http://schemas.openxmlformats.org/officeDocument/2006/relationships" xmlns:p="http://schemas.openxmlformats.org/presentationml/2006/main">
+  <p:cSld>
+    <p:spTree>
+      <p:nvGrpSpPr>
+        <p:cNvPr id="1" name=""/>
+        <p:cNvGrpSpPr/>
+        <p:nvPr/>
+      </p:nvGrpSpPr>
+      <p:grpSpPr>
+        <a:xfrm>
+          <a:off x="0" y="0"/>
+          <a:ext cx="0" cy="0"/>
+          <a:chOff x="0" y="0"/>
+          <a:chExt cx="0" cy="0"/>
+        </a:xfrm>
+      </p:grpSpPr>
+      <p:sp>
+        <p:nvSpPr>
+          <p:cNvPr id="2" name="Title 1"/>
+          <p:cNvSpPr>
+            <a:spLocks noGrp="1"/>
+          </p:cNvSpPr>
+          <p:nvPr>
+            <p:ph type="title"/>
+          </p:nvPr>
+        </p:nvSpPr>
+        <p:spPr/>
+        <p:txBody>
+          <a:bodyPr/>
+          <a:lstStyle/>
+          <a:p>
+            <a:r>
+              <a:rPr lang="en-US" dirty="0" smtClean="0"/>
+              <a:t>Actual Lights</a:t>
+            </a:r>
+            <a:endParaRPr lang="en-US" dirty="0"/>
+          </a:p>
+        </p:txBody>
+      </p:sp>
+      <p:grpSp>
+        <p:nvGrpSpPr>
+          <p:cNvPr id="3" name="Group 2"/>
+          <p:cNvGrpSpPr/>
+          <p:nvPr/>
+        </p:nvGrpSpPr>
+        <p:grpSpPr>
+          <a:xfrm>
+            <a:off x="2895600" y="1125910"/>
+            <a:ext cx="6400800" cy="4800599"/>
+            <a:chOff x="2895600" y="1125910"/>
+            <a:chExt cx="6400800" cy="4800599"/>
+          </a:xfrm>
+        </p:grpSpPr>
+        <p:sp>
+          <p:nvSpPr>
+            <p:cNvPr id="4" name="Rectangle 3"/>
+            <p:cNvSpPr/>
+            <p:nvPr/>
+          </p:nvSpPr>
+          <p:spPr>
+            <a:xfrm>
+              <a:off x="2895600" y="1811709"/>
+              <a:ext cx="6400800" cy="4114800"/>
+            </a:xfrm>
+            <a:prstGeom prst="rect">
+              <a:avLst/>
+            </a:prstGeom>
+          </p:spPr>
+          <p:style>
+            <a:lnRef idx="2">
+              <a:schemeClr val="accent1">
+                <a:shade val="50000"/>
+              </a:schemeClr>
+            </a:lnRef>
+            <a:fillRef idx="1">
+              <a:schemeClr val="accent1"/>
+            </a:fillRef>
+            <a:effectRef idx="0">
+              <a:schemeClr val="accent1"/>
+            </a:effectRef>
+            <a:fontRef idx="minor">
+              <a:schemeClr val="lt1"/>
+            </a:fontRef>
+          </p:style>
+          <p:txBody>
+            <a:bodyPr rtlCol="0" anchor="ctr"/>
+            <a:lstStyle/>
+            <a:p>
+              <a:pPr algn="ctr"/>
+              <a:endParaRPr lang="en-US"/>
+            </a:p>
+          </p:txBody>
+        </p:sp>
+        <p:sp>
+          <p:nvSpPr>
+            <p:cNvPr id="5" name="Arc 4"/>
+            <p:cNvSpPr/>
+            <p:nvPr/>
+          </p:nvSpPr>
+          <p:spPr>
+            <a:xfrm rot="5400000">
+              <a:off x="3694007" y="1128046"/>
+              <a:ext cx="1371600" cy="1367327"/>
+            </a:xfrm>
+            <a:prstGeom prst="arc">
+              <a:avLst/>
+            </a:prstGeom>
+            <a:solidFill>
+              <a:schemeClr val="bg1"/>
+            </a:solidFill>
+            <a:ln>
+              <a:noFill/>
+            </a:ln>
+          </p:spPr>
+          <p:style>
+            <a:lnRef idx="1">
+              <a:schemeClr val="accent1"/>
+            </a:lnRef>
+            <a:fillRef idx="0">
+              <a:schemeClr val="accent1"/>
+            </a:fillRef>
+            <a:effectRef idx="0">
+              <a:schemeClr val="accent1"/>
+            </a:effectRef>
+            <a:fontRef idx="minor">
+              <a:schemeClr val="tx1"/>
+            </a:fontRef>
+          </p:style>
+          <p:txBody>
+            <a:bodyPr rtlCol="0" anchor="ctr"/>
+            <a:lstStyle/>
+            <a:p>
+              <a:pPr algn="ctr"/>
+              <a:endParaRPr lang="en-US"/>
+            </a:p>
+          </p:txBody>
+        </p:sp>
+        <p:sp>
+          <p:nvSpPr>
+            <p:cNvPr id="6" name="Arc 5"/>
+            <p:cNvSpPr/>
+            <p:nvPr/>
+          </p:nvSpPr>
+          <p:spPr>
+            <a:xfrm rot="16200000" flipH="1">
+              <a:off x="5063471" y="1436424"/>
+              <a:ext cx="731520" cy="731520"/>
+            </a:xfrm>
+            <a:prstGeom prst="arc">
+              <a:avLst/>
+            </a:prstGeom>
+            <a:solidFill>
+              <a:schemeClr val="bg1"/>
+            </a:solidFill>
+            <a:ln>
+              <a:noFill/>
+            </a:ln>
+          </p:spPr>
+          <p:style>
+            <a:lnRef idx="1">
+              <a:schemeClr val="accent1"/>
+            </a:lnRef>
+            <a:fillRef idx="0">
+              <a:schemeClr val="accent1"/>
+            </a:fillRef>
+            <a:effectRef idx="0">
+              <a:schemeClr val="accent1"/>
+            </a:effectRef>
+            <a:fontRef idx="minor">
+              <a:schemeClr val="tx1"/>
+            </a:fontRef>
+          </p:style>
+          <p:txBody>
+            <a:bodyPr rtlCol="0" anchor="ctr"/>
+            <a:lstStyle/>
+            <a:p>
+              <a:pPr algn="ctr"/>
+              <a:endParaRPr lang="en-US"/>
+            </a:p>
+          </p:txBody>
+        </p:sp>
+      </p:grpSp>
+      <p:sp>
+        <p:nvSpPr>
+          <p:cNvPr id="7" name="TextBox 6"/>
+          <p:cNvSpPr txBox="1"/>
+          <p:nvPr/>
+        </p:nvSpPr>
+        <p:spPr>
+          <a:xfrm>
+            <a:off x="5112017" y="6013447"/>
+            <a:ext cx="2190215" cy="369332"/>
+          </a:xfrm>
+          <a:prstGeom prst="rect">
+            <a:avLst/>
+          </a:prstGeom>
+          <a:noFill/>
+        </p:spPr>
+        <p:txBody>
+          <a:bodyPr wrap="none" rtlCol="0">
+            <a:spAutoFit/>
+          </a:bodyPr>
+          <a:lstStyle/>
+          <a:p>
+            <a:r>
+              <a:rPr lang="en-US" dirty="0" smtClean="0"/>
+              <a:t>Northwest (NW) Wall</a:t>
+            </a:r>
+            <a:endParaRPr lang="en-US" dirty="0"/>
+          </a:p>
+        </p:txBody>
+      </p:sp>
+      <p:sp>
+        <p:nvSpPr>
+          <p:cNvPr id="8" name="TextBox 7"/>
+          <p:cNvSpPr txBox="1"/>
+          <p:nvPr/>
+        </p:nvSpPr>
+        <p:spPr>
+          <a:xfrm>
+            <a:off x="5206370" y="1431662"/>
+            <a:ext cx="2001510" cy="369332"/>
+          </a:xfrm>
+          <a:prstGeom prst="rect">
+            <a:avLst/>
+          </a:prstGeom>
+          <a:noFill/>
+        </p:spPr>
+        <p:txBody>
+          <a:bodyPr wrap="none" rtlCol="0">
+            <a:spAutoFit/>
+          </a:bodyPr>
+          <a:lstStyle/>
+          <a:p>
+            <a:r>
+              <a:rPr lang="en-US" dirty="0" smtClean="0"/>
+              <a:t>Southeast (SE) Wall</a:t>
+            </a:r>
+            <a:endParaRPr lang="en-US" dirty="0"/>
+          </a:p>
+        </p:txBody>
+      </p:sp>
+      <p:sp>
+        <p:nvSpPr>
+          <p:cNvPr id="9" name="TextBox 8"/>
+          <p:cNvSpPr txBox="1"/>
+          <p:nvPr/>
+        </p:nvSpPr>
+        <p:spPr>
+          <a:xfrm rot="16200000">
+            <a:off x="1651905" y="3571473"/>
+            <a:ext cx="2046394" cy="369332"/>
+          </a:xfrm>
+          <a:prstGeom prst="rect">
+            <a:avLst/>
+          </a:prstGeom>
+          <a:noFill/>
+        </p:spPr>
+        <p:txBody>
+          <a:bodyPr wrap="none" rtlCol="0">
+            <a:spAutoFit/>
+          </a:bodyPr>
+          <a:lstStyle/>
+          <a:p>
+            <a:r>
+              <a:rPr lang="en-US" dirty="0" smtClean="0"/>
+              <a:t>Northeast (NE) Wall</a:t>
+            </a:r>
+            <a:endParaRPr lang="en-US" dirty="0"/>
+          </a:p>
+        </p:txBody>
+      </p:sp>
+      <p:sp>
+        <p:nvSpPr>
+          <p:cNvPr id="10" name="TextBox 9"/>
+          <p:cNvSpPr txBox="1"/>
+          <p:nvPr/>
+        </p:nvSpPr>
+        <p:spPr>
+          <a:xfrm rot="16200000">
+            <a:off x="8480905" y="3552845"/>
+            <a:ext cx="2143664" cy="369332"/>
+          </a:xfrm>
+          <a:prstGeom prst="rect">
+            <a:avLst/>
+          </a:prstGeom>
+          <a:noFill/>
+        </p:spPr>
+        <p:txBody>
+          <a:bodyPr wrap="none" rtlCol="0">
+            <a:spAutoFit/>
+          </a:bodyPr>
+          <a:lstStyle/>
+          <a:p>
+            <a:r>
+              <a:rPr lang="en-US" dirty="0" smtClean="0"/>
+              <a:t>Southwest (SW) Wall</a:t>
+            </a:r>
+            <a:endParaRPr lang="en-US" dirty="0"/>
+          </a:p>
+        </p:txBody>
+      </p:sp>
+      <p:cxnSp>
+        <p:nvCxnSpPr>
+          <p:cNvPr id="12" name="Straight Arrow Connector 11"/>
+          <p:cNvCxnSpPr/>
+          <p:nvPr/>
+        </p:nvCxnSpPr>
+        <p:spPr>
+          <a:xfrm flipH="1">
+            <a:off x="7933346" y="5926509"/>
+            <a:ext cx="1371600" cy="0"/>
+          </a:xfrm>
+          <a:prstGeom prst="straightConnector1">
+            <a:avLst/>
+          </a:prstGeom>
+          <a:ln w="57150">
+            <a:solidFill>
+              <a:srgbClr val="00FF00"/>
+            </a:solidFill>
+            <a:headEnd type="none" w="med" len="med"/>
+            <a:tailEnd type="arrow" w="med" len="med"/>
+          </a:ln>
+        </p:spPr>
+        <p:style>
+          <a:lnRef idx="1">
+            <a:schemeClr val="accent1"/>
+          </a:lnRef>
+          <a:fillRef idx="0">
+            <a:schemeClr val="accent1"/>
+          </a:fillRef>
+          <a:effectRef idx="0">
+            <a:schemeClr val="accent1"/>
+          </a:effectRef>
+          <a:fontRef idx="minor">
+            <a:schemeClr val="tx1"/>
+          </a:fontRef>
+        </p:style>
+      </p:cxnSp>
+      <p:cxnSp>
+        <p:nvCxnSpPr>
+          <p:cNvPr id="14" name="Straight Arrow Connector 13"/>
+          <p:cNvCxnSpPr/>
+          <p:nvPr/>
+        </p:nvCxnSpPr>
+        <p:spPr>
+          <a:xfrm rot="5400000" flipH="1">
+            <a:off x="8610600" y="5250234"/>
+            <a:ext cx="1371600" cy="0"/>
+          </a:xfrm>
+          <a:prstGeom prst="straightConnector1">
+            <a:avLst/>
+          </a:prstGeom>
+          <a:ln w="57150">
+            <a:solidFill>
+              <a:srgbClr val="FF0000"/>
+            </a:solidFill>
+            <a:headEnd type="none" w="med" len="med"/>
+            <a:tailEnd type="arrow" w="med" len="med"/>
+          </a:ln>
+        </p:spPr>
+        <p:style>
+          <a:lnRef idx="1">
+            <a:schemeClr val="accent1"/>
+          </a:lnRef>
+          <a:fillRef idx="0">
+            <a:schemeClr val="accent1"/>
+          </a:fillRef>
+          <a:effectRef idx="0">
+            <a:schemeClr val="accent1"/>
+          </a:effectRef>
+          <a:fontRef idx="minor">
+            <a:schemeClr val="tx1"/>
+          </a:fontRef>
+        </p:style>
+      </p:cxnSp>
+      <mc:AlternateContent xmlns:mc="http://schemas.openxmlformats.org/markup-compatibility/2006" xmlns:a14="http://schemas.microsoft.com/office/drawing/2010/main">
+        <mc:Choice Requires="a14">
+          <p:sp>
+            <p:nvSpPr>
+              <p:cNvPr id="13" name="TextBox 12"/>
+              <p:cNvSpPr txBox="1"/>
+              <p:nvPr/>
+            </p:nvSpPr>
+            <p:spPr>
+              <a:xfrm>
+                <a:off x="8116018" y="5916985"/>
+                <a:ext cx="498855" cy="369332"/>
+              </a:xfrm>
+              <a:prstGeom prst="rect">
+                <a:avLst/>
+              </a:prstGeom>
+              <a:noFill/>
+            </p:spPr>
+            <p:txBody>
+              <a:bodyPr wrap="none" rtlCol="0">
+                <a:spAutoFit/>
+              </a:bodyPr>
+              <a:lstStyle/>
+              <a:p>
+                <a:pPr/>
+                <a14:m>
+                  <m:oMathPara xmlns:m="http://schemas.openxmlformats.org/officeDocument/2006/math">
+                    <m:oMathParaPr>
+                      <m:jc m:val="centerGroup"/>
+                    </m:oMathParaPr>
+                    <m:oMath xmlns:m="http://schemas.openxmlformats.org/officeDocument/2006/math">
+                      <m:sSub>
+                        <m:sSubPr>
+                          <m:ctrlPr>
+                            <a:rPr lang="en-US" b="0" i="1" smtClean="0">
+                              <a:latin typeface="Cambria Math" panose="02040503050406030204" pitchFamily="18" charset="0"/>
+                            </a:rPr>
+                          </m:ctrlPr>
+                        </m:sSubPr>
+                        <m:e>
+                          <m:r>
+                            <a:rPr lang="en-US" b="0" i="1" smtClean="0">
+                              <a:latin typeface="Cambria Math" panose="02040503050406030204" pitchFamily="18" charset="0"/>
+                            </a:rPr>
+                            <m:t>𝑦</m:t>
+                          </m:r>
+                        </m:e>
+                        <m:sub>
+                          <m:r>
+                            <a:rPr lang="en-US" b="0" i="1" smtClean="0">
+                              <a:latin typeface="Cambria Math" panose="02040503050406030204" pitchFamily="18" charset="0"/>
+                            </a:rPr>
+                            <m:t>𝑤</m:t>
+                          </m:r>
+                        </m:sub>
+                      </m:sSub>
+                    </m:oMath>
+                  </m:oMathPara>
+                </a14:m>
+                <a:endParaRPr lang="en-US" dirty="0"/>
+              </a:p>
+            </p:txBody>
+          </p:sp>
+        </mc:Choice>
+        <mc:Fallback xmlns="">
+          <p:sp>
+            <p:nvSpPr>
+              <p:cNvPr id="13" name="TextBox 12"/>
+              <p:cNvSpPr txBox="1">
+                <a:spLocks noRot="1" noChangeAspect="1" noMove="1" noResize="1" noEditPoints="1" noAdjustHandles="1" noChangeArrowheads="1" noChangeShapeType="1" noTextEdit="1"/>
+              </p:cNvSpPr>
+              <p:nvPr/>
+            </p:nvSpPr>
+            <p:spPr>
+              <a:xfrm>
+                <a:off x="8116018" y="5916985"/>
+                <a:ext cx="498855" cy="369332"/>
+              </a:xfrm>
+              <a:prstGeom prst="rect">
+                <a:avLst/>
+              </a:prstGeom>
+              <a:blipFill>
+                <a:blip r:embed="rId3"/>
+                <a:stretch>
+                  <a:fillRect b="-6667"/>
+                </a:stretch>
+              </a:blipFill>
+            </p:spPr>
+            <p:txBody>
+              <a:bodyPr/>
+              <a:lstStyle/>
+              <a:p>
+                <a:r>
+                  <a:rPr lang="en-US">
+                    <a:noFill/>
+                  </a:rPr>
+                  <a:t> </a:t>
+                </a:r>
+              </a:p>
+            </p:txBody>
+          </p:sp>
+        </mc:Fallback>
+      </mc:AlternateContent>
+      <mc:AlternateContent xmlns:mc="http://schemas.openxmlformats.org/markup-compatibility/2006" xmlns:a14="http://schemas.microsoft.com/office/drawing/2010/main">
+        <mc:Choice Requires="a14">
+          <p:sp>
+            <p:nvSpPr>
+              <p:cNvPr id="16" name="TextBox 15"/>
+              <p:cNvSpPr txBox="1"/>
+              <p:nvPr/>
+            </p:nvSpPr>
+            <p:spPr>
+              <a:xfrm>
+                <a:off x="9260795" y="4750761"/>
+                <a:ext cx="510460" cy="369332"/>
+              </a:xfrm>
+              <a:prstGeom prst="rect">
+                <a:avLst/>
+              </a:prstGeom>
+              <a:noFill/>
+            </p:spPr>
+            <p:txBody>
+              <a:bodyPr wrap="none" rtlCol="0">
+                <a:spAutoFit/>
+              </a:bodyPr>
+              <a:lstStyle/>
+              <a:p>
+                <a:pPr/>
+                <a14:m>
+                  <m:oMathPara xmlns:m="http://schemas.openxmlformats.org/officeDocument/2006/math">
+                    <m:oMathParaPr>
+                      <m:jc m:val="centerGroup"/>
+                    </m:oMathParaPr>
+                    <m:oMath xmlns:m="http://schemas.openxmlformats.org/officeDocument/2006/math">
+                      <m:sSub>
+                        <m:sSubPr>
+                          <m:ctrlPr>
+                            <a:rPr lang="en-US" b="0" i="1" smtClean="0">
+                              <a:latin typeface="Cambria Math" panose="02040503050406030204" pitchFamily="18" charset="0"/>
+                            </a:rPr>
+                          </m:ctrlPr>
+                        </m:sSubPr>
+                        <m:e>
+                          <m:r>
+                            <a:rPr lang="en-US" b="0" i="1" smtClean="0">
+                              <a:latin typeface="Cambria Math" panose="02040503050406030204" pitchFamily="18" charset="0"/>
+                            </a:rPr>
+                            <m:t>𝑥</m:t>
+                          </m:r>
+                        </m:e>
+                        <m:sub>
+                          <m:r>
+                            <a:rPr lang="en-US" b="0" i="1" smtClean="0">
+                              <a:latin typeface="Cambria Math" panose="02040503050406030204" pitchFamily="18" charset="0"/>
+                            </a:rPr>
+                            <m:t>𝑤</m:t>
+                          </m:r>
+                        </m:sub>
+                      </m:sSub>
+                    </m:oMath>
+                  </m:oMathPara>
+                </a14:m>
+                <a:endParaRPr lang="en-US" dirty="0"/>
+              </a:p>
+            </p:txBody>
+          </p:sp>
+        </mc:Choice>
+        <mc:Fallback xmlns="">
+          <p:sp>
+            <p:nvSpPr>
+              <p:cNvPr id="16" name="TextBox 15"/>
+              <p:cNvSpPr txBox="1">
+                <a:spLocks noRot="1" noChangeAspect="1" noMove="1" noResize="1" noEditPoints="1" noAdjustHandles="1" noChangeArrowheads="1" noChangeShapeType="1" noTextEdit="1"/>
+              </p:cNvSpPr>
+              <p:nvPr/>
+            </p:nvSpPr>
+            <p:spPr>
+              <a:xfrm>
+                <a:off x="9260795" y="4750761"/>
+                <a:ext cx="510460" cy="369332"/>
+              </a:xfrm>
+              <a:prstGeom prst="rect">
+                <a:avLst/>
+              </a:prstGeom>
+              <a:blipFill>
+                <a:blip r:embed="rId4"/>
+                <a:stretch>
+                  <a:fillRect/>
+                </a:stretch>
+              </a:blipFill>
+            </p:spPr>
+            <p:txBody>
+              <a:bodyPr/>
+              <a:lstStyle/>
+              <a:p>
+                <a:r>
+                  <a:rPr lang="en-US">
+                    <a:noFill/>
+                  </a:rPr>
+                  <a:t> </a:t>
+                </a:r>
+              </a:p>
+            </p:txBody>
+          </p:sp>
+        </mc:Fallback>
+      </mc:AlternateContent>
+      <mc:AlternateContent xmlns:mc="http://schemas.openxmlformats.org/markup-compatibility/2006" xmlns:a14="http://schemas.microsoft.com/office/drawing/2010/main">
+        <mc:Choice Requires="a14">
+          <p:sp>
+            <p:nvSpPr>
+              <p:cNvPr id="17" name="TextBox 16"/>
+              <p:cNvSpPr txBox="1"/>
+              <p:nvPr/>
+            </p:nvSpPr>
+            <p:spPr>
+              <a:xfrm>
+                <a:off x="8905597" y="5935540"/>
+                <a:ext cx="456482" cy="369332"/>
+              </a:xfrm>
+              <a:prstGeom prst="rect">
+                <a:avLst/>
+              </a:prstGeom>
+              <a:noFill/>
+            </p:spPr>
+            <p:txBody>
+              <a:bodyPr wrap="square" rtlCol="0">
+                <a:spAutoFit/>
+              </a:bodyPr>
+              <a:lstStyle/>
+              <a:p>
+                <a:pPr/>
+                <a14:m>
+                  <m:oMathPara xmlns:m="http://schemas.openxmlformats.org/officeDocument/2006/math">
+                    <m:oMathParaPr>
+                      <m:jc m:val="centerGroup"/>
+                    </m:oMathParaPr>
+                    <m:oMath xmlns:m="http://schemas.openxmlformats.org/officeDocument/2006/math">
+                      <m:sSub>
+                        <m:sSubPr>
+                          <m:ctrlPr>
+                            <a:rPr lang="en-US" b="0" i="1" smtClean="0">
+                              <a:latin typeface="Cambria Math" panose="02040503050406030204" pitchFamily="18" charset="0"/>
+                            </a:rPr>
+                          </m:ctrlPr>
+                        </m:sSubPr>
+                        <m:e>
+                          <m:r>
+                            <a:rPr lang="en-US" b="0" i="1" smtClean="0">
+                              <a:latin typeface="Cambria Math" panose="02040503050406030204" pitchFamily="18" charset="0"/>
+                            </a:rPr>
+                            <m:t>𝑜</m:t>
+                          </m:r>
+                        </m:e>
+                        <m:sub>
+                          <m:r>
+                            <a:rPr lang="en-US" b="0" i="1" smtClean="0">
+                              <a:latin typeface="Cambria Math" panose="02040503050406030204" pitchFamily="18" charset="0"/>
+                            </a:rPr>
+                            <m:t>𝑤</m:t>
+                          </m:r>
+                        </m:sub>
+                      </m:sSub>
+                    </m:oMath>
+                  </m:oMathPara>
+                </a14:m>
+                <a:endParaRPr lang="en-US" dirty="0"/>
+              </a:p>
+            </p:txBody>
+          </p:sp>
+        </mc:Choice>
+        <mc:Fallback xmlns="">
+          <p:sp>
+            <p:nvSpPr>
+              <p:cNvPr id="17" name="TextBox 16"/>
+              <p:cNvSpPr txBox="1">
+                <a:spLocks noRot="1" noChangeAspect="1" noMove="1" noResize="1" noEditPoints="1" noAdjustHandles="1" noChangeArrowheads="1" noChangeShapeType="1" noTextEdit="1"/>
+              </p:cNvSpPr>
+              <p:nvPr/>
+            </p:nvSpPr>
+            <p:spPr>
+              <a:xfrm>
+                <a:off x="8905597" y="5935540"/>
+                <a:ext cx="456482" cy="369332"/>
+              </a:xfrm>
+              <a:prstGeom prst="rect">
+                <a:avLst/>
+              </a:prstGeom>
+              <a:blipFill>
+                <a:blip r:embed="rId5"/>
+                <a:stretch>
+                  <a:fillRect/>
+                </a:stretch>
+              </a:blipFill>
+            </p:spPr>
+            <p:txBody>
+              <a:bodyPr/>
+              <a:lstStyle/>
+              <a:p>
+                <a:r>
+                  <a:rPr lang="en-US">
+                    <a:noFill/>
+                  </a:rPr>
+                  <a:t> </a:t>
+                </a:r>
+              </a:p>
+            </p:txBody>
+          </p:sp>
+        </mc:Fallback>
+      </mc:AlternateContent>
+      <p:grpSp>
+        <p:nvGrpSpPr>
+          <p:cNvPr id="19" name="Group 18"/>
+          <p:cNvGrpSpPr/>
+          <p:nvPr/>
+        </p:nvGrpSpPr>
+        <p:grpSpPr>
+          <a:xfrm>
+            <a:off x="2595688" y="5478834"/>
+            <a:ext cx="757112" cy="753362"/>
+            <a:chOff x="2595688" y="5478834"/>
+            <a:chExt cx="757112" cy="753362"/>
+          </a:xfrm>
+        </p:grpSpPr>
+        <p:cxnSp>
+          <p:nvCxnSpPr>
+            <p:cNvPr id="15" name="Straight Arrow Connector 14"/>
+            <p:cNvCxnSpPr/>
+            <p:nvPr/>
+          </p:nvCxnSpPr>
+          <p:spPr>
+            <a:xfrm flipV="1">
+              <a:off x="2895600" y="5936034"/>
+              <a:ext cx="457200" cy="0"/>
+            </a:xfrm>
+            <a:prstGeom prst="straightConnector1">
+              <a:avLst/>
+            </a:prstGeom>
+            <a:ln w="38100">
+              <a:solidFill>
+                <a:srgbClr val="0000FF"/>
+              </a:solidFill>
+              <a:headEnd type="none" w="med" len="med"/>
+              <a:tailEnd type="arrow" w="med" len="med"/>
+            </a:ln>
+          </p:spPr>
+          <p:style>
+            <a:lnRef idx="1">
+              <a:schemeClr val="accent1"/>
+            </a:lnRef>
+            <a:fillRef idx="0">
+              <a:schemeClr val="accent1"/>
+            </a:fillRef>
+            <a:effectRef idx="0">
+              <a:schemeClr val="accent1"/>
+            </a:effectRef>
+            <a:fontRef idx="minor">
+              <a:schemeClr val="tx1"/>
+            </a:fontRef>
+          </p:style>
+        </p:cxnSp>
+        <p:cxnSp>
+          <p:nvCxnSpPr>
+            <p:cNvPr id="18" name="Straight Arrow Connector 17"/>
+            <p:cNvCxnSpPr/>
+            <p:nvPr/>
+          </p:nvCxnSpPr>
+          <p:spPr>
+            <a:xfrm flipH="1" flipV="1">
+              <a:off x="2895599" y="5478834"/>
+              <a:ext cx="0" cy="457200"/>
+            </a:xfrm>
+            <a:prstGeom prst="straightConnector1">
+              <a:avLst/>
+            </a:prstGeom>
+            <a:ln w="38100">
+              <a:solidFill>
+                <a:srgbClr val="FF0000"/>
+              </a:solidFill>
+              <a:headEnd type="none" w="med" len="med"/>
+              <a:tailEnd type="arrow" w="med" len="med"/>
+            </a:ln>
+          </p:spPr>
+          <p:style>
+            <a:lnRef idx="1">
+              <a:schemeClr val="accent1"/>
+            </a:lnRef>
+            <a:fillRef idx="0">
+              <a:schemeClr val="accent1"/>
+            </a:fillRef>
+            <a:effectRef idx="0">
+              <a:schemeClr val="accent1"/>
+            </a:effectRef>
+            <a:fontRef idx="minor">
+              <a:schemeClr val="tx1"/>
+            </a:fontRef>
+          </p:style>
+        </p:cxnSp>
+        <mc:AlternateContent xmlns:mc="http://schemas.openxmlformats.org/markup-compatibility/2006" xmlns:a14="http://schemas.microsoft.com/office/drawing/2010/main">
+          <mc:Choice Requires="a14">
+            <p:sp>
+              <p:nvSpPr>
+                <p:cNvPr id="20" name="TextBox 19"/>
+                <p:cNvSpPr txBox="1"/>
+                <p:nvPr/>
+              </p:nvSpPr>
+              <p:spPr>
+                <a:xfrm>
+                  <a:off x="2595688" y="5862864"/>
+                  <a:ext cx="456482" cy="369332"/>
+                </a:xfrm>
+                <a:prstGeom prst="rect">
+                  <a:avLst/>
+                </a:prstGeom>
+                <a:noFill/>
+              </p:spPr>
+              <p:txBody>
+                <a:bodyPr wrap="square" rtlCol="0">
+                  <a:spAutoFit/>
+                </a:bodyPr>
+                <a:lstStyle/>
+                <a:p>
+                  <a:pPr/>
+                  <a14:m>
+                    <m:oMathPara xmlns:m="http://schemas.openxmlformats.org/officeDocument/2006/math">
+                      <m:oMathParaPr>
+                        <m:jc m:val="centerGroup"/>
+                      </m:oMathParaPr>
+                      <m:oMath xmlns:m="http://schemas.openxmlformats.org/officeDocument/2006/math">
+                        <m:sSub>
+                          <m:sSubPr>
+                            <m:ctrlPr>
+                              <a:rPr lang="en-US" b="0" i="1" smtClean="0">
+                                <a:latin typeface="Cambria Math" panose="02040503050406030204" pitchFamily="18" charset="0"/>
+                              </a:rPr>
+                            </m:ctrlPr>
+                          </m:sSubPr>
+                          <m:e>
+                            <m:r>
+                              <a:rPr lang="en-US" b="0" i="1" smtClean="0">
+                                <a:latin typeface="Cambria Math" panose="02040503050406030204" pitchFamily="18" charset="0"/>
+                              </a:rPr>
+                              <m:t>𝑜</m:t>
+                            </m:r>
+                          </m:e>
+                          <m:sub>
+                            <m:r>
+                              <a:rPr lang="en-US" b="0" i="1" smtClean="0">
+                                <a:latin typeface="Cambria Math" panose="02040503050406030204" pitchFamily="18" charset="0"/>
+                              </a:rPr>
+                              <m:t>𝑁𝐸</m:t>
+                            </m:r>
+                          </m:sub>
+                        </m:sSub>
+                      </m:oMath>
+                    </m:oMathPara>
+                  </a14:m>
+                  <a:endParaRPr lang="en-US" dirty="0"/>
+                </a:p>
+              </p:txBody>
+            </p:sp>
+          </mc:Choice>
+          <mc:Fallback xmlns="">
+            <p:sp>
+              <p:nvSpPr>
+                <p:cNvPr id="20" name="TextBox 19"/>
+                <p:cNvSpPr txBox="1">
+                  <a:spLocks noRot="1" noChangeAspect="1" noMove="1" noResize="1" noEditPoints="1" noAdjustHandles="1" noChangeArrowheads="1" noChangeShapeType="1" noTextEdit="1"/>
+                </p:cNvSpPr>
+                <p:nvPr/>
+              </p:nvSpPr>
+              <p:spPr>
+                <a:xfrm>
+                  <a:off x="2595688" y="5862864"/>
+                  <a:ext cx="456482" cy="369332"/>
+                </a:xfrm>
+                <a:prstGeom prst="rect">
+                  <a:avLst/>
+                </a:prstGeom>
+                <a:blipFill>
+                  <a:blip r:embed="rId6"/>
+                  <a:stretch>
+                    <a:fillRect r="-9333"/>
+                  </a:stretch>
+                </a:blipFill>
+              </p:spPr>
+              <p:txBody>
+                <a:bodyPr/>
+                <a:lstStyle/>
+                <a:p>
+                  <a:r>
+                    <a:rPr lang="en-US">
+                      <a:noFill/>
+                    </a:rPr>
+                    <a:t> </a:t>
+                  </a:r>
+                </a:p>
+              </p:txBody>
+            </p:sp>
+          </mc:Fallback>
+        </mc:AlternateContent>
+      </p:grpSp>
+      <p:grpSp>
+        <p:nvGrpSpPr>
+          <p:cNvPr id="22" name="Group 21"/>
+          <p:cNvGrpSpPr/>
+          <p:nvPr/>
+        </p:nvGrpSpPr>
+        <p:grpSpPr>
+          <a:xfrm rot="5400000">
+            <a:off x="2884104" y="1815460"/>
+            <a:ext cx="457201" cy="457200"/>
+            <a:chOff x="2895599" y="5478834"/>
+            <a:chExt cx="457201" cy="457200"/>
+          </a:xfrm>
+        </p:grpSpPr>
+        <p:cxnSp>
+          <p:nvCxnSpPr>
+            <p:cNvPr id="23" name="Straight Arrow Connector 22"/>
+            <p:cNvCxnSpPr/>
+            <p:nvPr/>
+          </p:nvCxnSpPr>
+          <p:spPr>
+            <a:xfrm flipV="1">
+              <a:off x="2895600" y="5936034"/>
+              <a:ext cx="457200" cy="0"/>
+            </a:xfrm>
+            <a:prstGeom prst="straightConnector1">
+              <a:avLst/>
+            </a:prstGeom>
+            <a:ln w="38100">
+              <a:solidFill>
+                <a:srgbClr val="0000FF"/>
+              </a:solidFill>
+              <a:headEnd type="none" w="med" len="med"/>
+              <a:tailEnd type="arrow" w="med" len="med"/>
+            </a:ln>
+          </p:spPr>
+          <p:style>
+            <a:lnRef idx="1">
+              <a:schemeClr val="accent1"/>
+            </a:lnRef>
+            <a:fillRef idx="0">
+              <a:schemeClr val="accent1"/>
+            </a:fillRef>
+            <a:effectRef idx="0">
+              <a:schemeClr val="accent1"/>
+            </a:effectRef>
+            <a:fontRef idx="minor">
+              <a:schemeClr val="tx1"/>
+            </a:fontRef>
+          </p:style>
+        </p:cxnSp>
+        <p:cxnSp>
+          <p:nvCxnSpPr>
+            <p:cNvPr id="24" name="Straight Arrow Connector 23"/>
+            <p:cNvCxnSpPr/>
+            <p:nvPr/>
+          </p:nvCxnSpPr>
+          <p:spPr>
+            <a:xfrm flipH="1" flipV="1">
+              <a:off x="2895599" y="5478834"/>
+              <a:ext cx="0" cy="457200"/>
+            </a:xfrm>
+            <a:prstGeom prst="straightConnector1">
+              <a:avLst/>
+            </a:prstGeom>
+            <a:ln w="38100">
+              <a:solidFill>
+                <a:srgbClr val="FF0000"/>
+              </a:solidFill>
+              <a:headEnd type="none" w="med" len="med"/>
+              <a:tailEnd type="arrow" w="med" len="med"/>
+            </a:ln>
+          </p:spPr>
+          <p:style>
+            <a:lnRef idx="1">
+              <a:schemeClr val="accent1"/>
+            </a:lnRef>
+            <a:fillRef idx="0">
+              <a:schemeClr val="accent1"/>
+            </a:fillRef>
+            <a:effectRef idx="0">
+              <a:schemeClr val="accent1"/>
+            </a:effectRef>
+            <a:fontRef idx="minor">
+              <a:schemeClr val="tx1"/>
+            </a:fontRef>
+          </p:style>
+        </p:cxnSp>
+      </p:grpSp>
+      <p:grpSp>
+        <p:nvGrpSpPr>
+          <p:cNvPr id="26" name="Group 25"/>
+          <p:cNvGrpSpPr/>
+          <p:nvPr/>
+        </p:nvGrpSpPr>
+        <p:grpSpPr>
+          <a:xfrm rot="10800000">
+            <a:off x="8847745" y="1811708"/>
+            <a:ext cx="457201" cy="457200"/>
+            <a:chOff x="2895599" y="5478834"/>
+            <a:chExt cx="457201" cy="457200"/>
+          </a:xfrm>
+        </p:grpSpPr>
+        <p:cxnSp>
+          <p:nvCxnSpPr>
+            <p:cNvPr id="27" name="Straight Arrow Connector 26"/>
+            <p:cNvCxnSpPr/>
+            <p:nvPr/>
+          </p:nvCxnSpPr>
+          <p:spPr>
+            <a:xfrm flipV="1">
+              <a:off x="2895600" y="5936034"/>
+              <a:ext cx="457200" cy="0"/>
+            </a:xfrm>
+            <a:prstGeom prst="straightConnector1">
+              <a:avLst/>
+            </a:prstGeom>
+            <a:ln w="38100">
+              <a:solidFill>
+                <a:srgbClr val="0000FF"/>
+              </a:solidFill>
+              <a:headEnd type="none" w="med" len="med"/>
+              <a:tailEnd type="arrow" w="med" len="med"/>
+            </a:ln>
+          </p:spPr>
+          <p:style>
+            <a:lnRef idx="1">
+              <a:schemeClr val="accent1"/>
+            </a:lnRef>
+            <a:fillRef idx="0">
+              <a:schemeClr val="accent1"/>
+            </a:fillRef>
+            <a:effectRef idx="0">
+              <a:schemeClr val="accent1"/>
+            </a:effectRef>
+            <a:fontRef idx="minor">
+              <a:schemeClr val="tx1"/>
+            </a:fontRef>
+          </p:style>
+        </p:cxnSp>
+        <p:cxnSp>
+          <p:nvCxnSpPr>
+            <p:cNvPr id="28" name="Straight Arrow Connector 27"/>
+            <p:cNvCxnSpPr/>
+            <p:nvPr/>
+          </p:nvCxnSpPr>
+          <p:spPr>
+            <a:xfrm flipH="1" flipV="1">
+              <a:off x="2895599" y="5478834"/>
+              <a:ext cx="0" cy="457200"/>
+            </a:xfrm>
+            <a:prstGeom prst="straightConnector1">
+              <a:avLst/>
+            </a:prstGeom>
+            <a:ln w="38100">
+              <a:solidFill>
+                <a:srgbClr val="FF0000"/>
+              </a:solidFill>
+              <a:headEnd type="none" w="med" len="med"/>
+              <a:tailEnd type="arrow" w="med" len="med"/>
+            </a:ln>
+          </p:spPr>
+          <p:style>
+            <a:lnRef idx="1">
+              <a:schemeClr val="accent1"/>
+            </a:lnRef>
+            <a:fillRef idx="0">
+              <a:schemeClr val="accent1"/>
+            </a:fillRef>
+            <a:effectRef idx="0">
+              <a:schemeClr val="accent1"/>
+            </a:effectRef>
+            <a:fontRef idx="minor">
+              <a:schemeClr val="tx1"/>
+            </a:fontRef>
+          </p:style>
+        </p:cxnSp>
+      </p:grpSp>
+      <p:grpSp>
+        <p:nvGrpSpPr>
+          <p:cNvPr id="29" name="Group 28"/>
+          <p:cNvGrpSpPr/>
+          <p:nvPr/>
+        </p:nvGrpSpPr>
+        <p:grpSpPr>
+          <a:xfrm rot="16200000">
+            <a:off x="8847745" y="5468817"/>
+            <a:ext cx="457201" cy="457200"/>
+            <a:chOff x="2895599" y="5478834"/>
+            <a:chExt cx="457201" cy="457200"/>
+          </a:xfrm>
+        </p:grpSpPr>
+        <p:cxnSp>
+          <p:nvCxnSpPr>
+            <p:cNvPr id="30" name="Straight Arrow Connector 29"/>
+            <p:cNvCxnSpPr/>
+            <p:nvPr/>
+          </p:nvCxnSpPr>
+          <p:spPr>
+            <a:xfrm flipV="1">
+              <a:off x="2895600" y="5936034"/>
+              <a:ext cx="457200" cy="0"/>
+            </a:xfrm>
+            <a:prstGeom prst="straightConnector1">
+              <a:avLst/>
+            </a:prstGeom>
+            <a:ln w="38100">
+              <a:solidFill>
+                <a:srgbClr val="0000FF"/>
+              </a:solidFill>
+              <a:headEnd type="none" w="med" len="med"/>
+              <a:tailEnd type="arrow" w="med" len="med"/>
+            </a:ln>
+          </p:spPr>
+          <p:style>
+            <a:lnRef idx="1">
+              <a:schemeClr val="accent1"/>
+            </a:lnRef>
+            <a:fillRef idx="0">
+              <a:schemeClr val="accent1"/>
+            </a:fillRef>
+            <a:effectRef idx="0">
+              <a:schemeClr val="accent1"/>
+            </a:effectRef>
+            <a:fontRef idx="minor">
+              <a:schemeClr val="tx1"/>
+            </a:fontRef>
+          </p:style>
+        </p:cxnSp>
+        <p:cxnSp>
+          <p:nvCxnSpPr>
+            <p:cNvPr id="31" name="Straight Arrow Connector 30"/>
+            <p:cNvCxnSpPr/>
+            <p:nvPr/>
+          </p:nvCxnSpPr>
+          <p:spPr>
+            <a:xfrm flipH="1" flipV="1">
+              <a:off x="2895599" y="5478834"/>
+              <a:ext cx="0" cy="457200"/>
+            </a:xfrm>
+            <a:prstGeom prst="straightConnector1">
+              <a:avLst/>
+            </a:prstGeom>
+            <a:ln w="38100">
+              <a:solidFill>
+                <a:srgbClr val="FF0000"/>
+              </a:solidFill>
+              <a:headEnd type="none" w="med" len="med"/>
+              <a:tailEnd type="arrow" w="med" len="med"/>
+            </a:ln>
+          </p:spPr>
+          <p:style>
+            <a:lnRef idx="1">
+              <a:schemeClr val="accent1"/>
+            </a:lnRef>
+            <a:fillRef idx="0">
+              <a:schemeClr val="accent1"/>
+            </a:fillRef>
+            <a:effectRef idx="0">
+              <a:schemeClr val="accent1"/>
+            </a:effectRef>
+            <a:fontRef idx="minor">
+              <a:schemeClr val="tx1"/>
+            </a:fontRef>
+          </p:style>
+        </p:cxnSp>
+      </p:grpSp>
+      <mc:AlternateContent xmlns:mc="http://schemas.openxmlformats.org/markup-compatibility/2006" xmlns:a14="http://schemas.microsoft.com/office/drawing/2010/main">
+        <mc:Choice Requires="a14">
+          <p:sp>
+            <p:nvSpPr>
+              <p:cNvPr id="32" name="TextBox 31"/>
+              <p:cNvSpPr txBox="1"/>
+              <p:nvPr/>
+            </p:nvSpPr>
+            <p:spPr>
+              <a:xfrm>
+                <a:off x="2396762" y="1506022"/>
+                <a:ext cx="456482" cy="369332"/>
+              </a:xfrm>
+              <a:prstGeom prst="rect">
+                <a:avLst/>
+              </a:prstGeom>
+              <a:noFill/>
+            </p:spPr>
+            <p:txBody>
+              <a:bodyPr wrap="square" rtlCol="0">
+                <a:spAutoFit/>
+              </a:bodyPr>
+              <a:lstStyle/>
+              <a:p>
+                <a:pPr/>
+                <a14:m>
+                  <m:oMathPara xmlns:m="http://schemas.openxmlformats.org/officeDocument/2006/math">
+                    <m:oMathParaPr>
+                      <m:jc m:val="centerGroup"/>
+                    </m:oMathParaPr>
+                    <m:oMath xmlns:m="http://schemas.openxmlformats.org/officeDocument/2006/math">
+                      <m:sSub>
+                        <m:sSubPr>
+                          <m:ctrlPr>
+                            <a:rPr lang="en-US" b="0" i="1" smtClean="0">
+                              <a:latin typeface="Cambria Math" panose="02040503050406030204" pitchFamily="18" charset="0"/>
+                            </a:rPr>
+                          </m:ctrlPr>
+                        </m:sSubPr>
+                        <m:e>
+                          <m:r>
+                            <a:rPr lang="en-US" b="0" i="1" smtClean="0">
+                              <a:latin typeface="Cambria Math" panose="02040503050406030204" pitchFamily="18" charset="0"/>
+                            </a:rPr>
+                            <m:t>𝑜</m:t>
+                          </m:r>
+                        </m:e>
+                        <m:sub>
+                          <m:r>
+                            <a:rPr lang="en-US" b="0" i="1" smtClean="0">
+                              <a:latin typeface="Cambria Math" panose="02040503050406030204" pitchFamily="18" charset="0"/>
+                            </a:rPr>
+                            <m:t>𝑆𝐸</m:t>
+                          </m:r>
+                        </m:sub>
+                      </m:sSub>
+                    </m:oMath>
+                  </m:oMathPara>
+                </a14:m>
+                <a:endParaRPr lang="en-US" dirty="0"/>
+              </a:p>
+            </p:txBody>
+          </p:sp>
+        </mc:Choice>
+        <mc:Fallback xmlns="">
+          <p:sp>
+            <p:nvSpPr>
+              <p:cNvPr id="32" name="TextBox 31"/>
+              <p:cNvSpPr txBox="1">
+                <a:spLocks noRot="1" noChangeAspect="1" noMove="1" noResize="1" noEditPoints="1" noAdjustHandles="1" noChangeArrowheads="1" noChangeShapeType="1" noTextEdit="1"/>
+              </p:cNvSpPr>
+              <p:nvPr/>
+            </p:nvSpPr>
+            <p:spPr>
+              <a:xfrm>
+                <a:off x="2396762" y="1506022"/>
+                <a:ext cx="456482" cy="369332"/>
+              </a:xfrm>
+              <a:prstGeom prst="rect">
+                <a:avLst/>
+              </a:prstGeom>
+              <a:blipFill>
+                <a:blip r:embed="rId7"/>
+                <a:stretch>
+                  <a:fillRect r="-1333"/>
+                </a:stretch>
+              </a:blipFill>
+            </p:spPr>
+            <p:txBody>
+              <a:bodyPr/>
+              <a:lstStyle/>
+              <a:p>
+                <a:r>
+                  <a:rPr lang="en-US">
+                    <a:noFill/>
+                  </a:rPr>
+                  <a:t> </a:t>
+                </a:r>
+              </a:p>
+            </p:txBody>
+          </p:sp>
+        </mc:Fallback>
+      </mc:AlternateContent>
+      <mc:AlternateContent xmlns:mc="http://schemas.openxmlformats.org/markup-compatibility/2006" xmlns:a14="http://schemas.microsoft.com/office/drawing/2010/main">
+        <mc:Choice Requires="a14">
+          <p:sp>
+            <p:nvSpPr>
+              <p:cNvPr id="33" name="TextBox 32"/>
+              <p:cNvSpPr txBox="1"/>
+              <p:nvPr/>
+            </p:nvSpPr>
+            <p:spPr>
+              <a:xfrm>
+                <a:off x="9301048" y="1476731"/>
+                <a:ext cx="456482" cy="369332"/>
+              </a:xfrm>
+              <a:prstGeom prst="rect">
+                <a:avLst/>
+              </a:prstGeom>
+              <a:noFill/>
+            </p:spPr>
+            <p:txBody>
+              <a:bodyPr wrap="square" rtlCol="0">
+                <a:spAutoFit/>
+              </a:bodyPr>
+              <a:lstStyle/>
+              <a:p>
+                <a:pPr/>
+                <a14:m>
+                  <m:oMathPara xmlns:m="http://schemas.openxmlformats.org/officeDocument/2006/math">
+                    <m:oMathParaPr>
+                      <m:jc m:val="centerGroup"/>
+                    </m:oMathParaPr>
+                    <m:oMath xmlns:m="http://schemas.openxmlformats.org/officeDocument/2006/math">
+                      <m:sSub>
+                        <m:sSubPr>
+                          <m:ctrlPr>
+                            <a:rPr lang="en-US" b="0" i="1" smtClean="0">
+                              <a:latin typeface="Cambria Math" panose="02040503050406030204" pitchFamily="18" charset="0"/>
+                            </a:rPr>
+                          </m:ctrlPr>
+                        </m:sSubPr>
+                        <m:e>
+                          <m:r>
+                            <a:rPr lang="en-US" b="0" i="1" smtClean="0">
+                              <a:latin typeface="Cambria Math" panose="02040503050406030204" pitchFamily="18" charset="0"/>
+                            </a:rPr>
+                            <m:t>𝑜</m:t>
+                          </m:r>
+                        </m:e>
+                        <m:sub>
+                          <m:r>
+                            <a:rPr lang="en-US" b="0" i="1" smtClean="0">
+                              <a:latin typeface="Cambria Math" panose="02040503050406030204" pitchFamily="18" charset="0"/>
+                            </a:rPr>
+                            <m:t>𝑆𝑊</m:t>
+                          </m:r>
+                        </m:sub>
+                      </m:sSub>
+                    </m:oMath>
+                  </m:oMathPara>
+                </a14:m>
+                <a:endParaRPr lang="en-US" dirty="0"/>
+              </a:p>
+            </p:txBody>
+          </p:sp>
+        </mc:Choice>
+        <mc:Fallback xmlns="">
+          <p:sp>
+            <p:nvSpPr>
+              <p:cNvPr id="33" name="TextBox 32"/>
+              <p:cNvSpPr txBox="1">
+                <a:spLocks noRot="1" noChangeAspect="1" noMove="1" noResize="1" noEditPoints="1" noAdjustHandles="1" noChangeArrowheads="1" noChangeShapeType="1" noTextEdit="1"/>
+              </p:cNvSpPr>
+              <p:nvPr/>
+            </p:nvSpPr>
+            <p:spPr>
+              <a:xfrm>
+                <a:off x="9301048" y="1476731"/>
+                <a:ext cx="456482" cy="369332"/>
+              </a:xfrm>
+              <a:prstGeom prst="rect">
+                <a:avLst/>
+              </a:prstGeom>
+              <a:blipFill>
+                <a:blip r:embed="rId8"/>
+                <a:stretch>
+                  <a:fillRect r="-12000"/>
+                </a:stretch>
+              </a:blipFill>
+            </p:spPr>
+            <p:txBody>
+              <a:bodyPr/>
+              <a:lstStyle/>
+              <a:p>
+                <a:r>
+                  <a:rPr lang="en-US">
+                    <a:noFill/>
+                  </a:rPr>
+                  <a:t> </a:t>
+                </a:r>
+              </a:p>
+            </p:txBody>
+          </p:sp>
+        </mc:Fallback>
+      </mc:AlternateContent>
+      <mc:AlternateContent xmlns:mc="http://schemas.openxmlformats.org/markup-compatibility/2006" xmlns:a14="http://schemas.microsoft.com/office/drawing/2010/main">
+        <mc:Choice Requires="a14">
+          <p:sp>
+            <p:nvSpPr>
+              <p:cNvPr id="34" name="TextBox 33"/>
+              <p:cNvSpPr txBox="1"/>
+              <p:nvPr/>
+            </p:nvSpPr>
+            <p:spPr>
+              <a:xfrm>
+                <a:off x="9338756" y="5707434"/>
+                <a:ext cx="456482" cy="369332"/>
+              </a:xfrm>
+              <a:prstGeom prst="rect">
+                <a:avLst/>
+              </a:prstGeom>
+              <a:noFill/>
+            </p:spPr>
+            <p:txBody>
+              <a:bodyPr wrap="square" rtlCol="0">
+                <a:spAutoFit/>
+              </a:bodyPr>
+              <a:lstStyle/>
+              <a:p>
+                <a:pPr/>
+                <a14:m>
+                  <m:oMathPara xmlns:m="http://schemas.openxmlformats.org/officeDocument/2006/math">
+                    <m:oMathParaPr>
+                      <m:jc m:val="centerGroup"/>
+                    </m:oMathParaPr>
+                    <m:oMath xmlns:m="http://schemas.openxmlformats.org/officeDocument/2006/math">
+                      <m:sSub>
+                        <m:sSubPr>
+                          <m:ctrlPr>
+                            <a:rPr lang="en-US" b="0" i="1" smtClean="0">
+                              <a:latin typeface="Cambria Math" panose="02040503050406030204" pitchFamily="18" charset="0"/>
+                            </a:rPr>
+                          </m:ctrlPr>
+                        </m:sSubPr>
+                        <m:e>
+                          <m:r>
+                            <a:rPr lang="en-US" b="0" i="1" smtClean="0">
+                              <a:latin typeface="Cambria Math" panose="02040503050406030204" pitchFamily="18" charset="0"/>
+                            </a:rPr>
+                            <m:t>𝑜</m:t>
+                          </m:r>
+                        </m:e>
+                        <m:sub>
+                          <m:r>
+                            <a:rPr lang="en-US" b="0" i="1" smtClean="0">
+                              <a:latin typeface="Cambria Math" panose="02040503050406030204" pitchFamily="18" charset="0"/>
+                            </a:rPr>
+                            <m:t>𝑁𝑊</m:t>
+                          </m:r>
+                        </m:sub>
+                      </m:sSub>
+                    </m:oMath>
+                  </m:oMathPara>
+                </a14:m>
+                <a:endParaRPr lang="en-US" dirty="0"/>
+              </a:p>
+            </p:txBody>
+          </p:sp>
+        </mc:Choice>
+        <mc:Fallback xmlns="">
+          <p:sp>
+            <p:nvSpPr>
+              <p:cNvPr id="34" name="TextBox 33"/>
+              <p:cNvSpPr txBox="1">
+                <a:spLocks noRot="1" noChangeAspect="1" noMove="1" noResize="1" noEditPoints="1" noAdjustHandles="1" noChangeArrowheads="1" noChangeShapeType="1" noTextEdit="1"/>
+              </p:cNvSpPr>
+              <p:nvPr/>
+            </p:nvSpPr>
+            <p:spPr>
+              <a:xfrm>
+                <a:off x="9338756" y="5707434"/>
+                <a:ext cx="456482" cy="369332"/>
+              </a:xfrm>
+              <a:prstGeom prst="rect">
+                <a:avLst/>
+              </a:prstGeom>
+              <a:blipFill>
+                <a:blip r:embed="rId9"/>
+                <a:stretch>
+                  <a:fillRect r="-21333"/>
+                </a:stretch>
+              </a:blipFill>
+            </p:spPr>
+            <p:txBody>
+              <a:bodyPr/>
+              <a:lstStyle/>
+              <a:p>
+                <a:r>
+                  <a:rPr lang="en-US">
+                    <a:noFill/>
+                  </a:rPr>
+                  <a:t> </a:t>
+                </a:r>
+              </a:p>
+            </p:txBody>
+          </p:sp>
+        </mc:Fallback>
+      </mc:AlternateContent>
+      <p:cxnSp>
+        <p:nvCxnSpPr>
+          <p:cNvPr id="35" name="Straight Connector 34"/>
+          <p:cNvCxnSpPr/>
+          <p:nvPr/>
+        </p:nvCxnSpPr>
+        <p:spPr>
+          <a:xfrm>
+            <a:off x="2888392" y="6185821"/>
+            <a:ext cx="0" cy="640080"/>
+          </a:xfrm>
+          <a:prstGeom prst="line">
+            <a:avLst/>
+          </a:prstGeom>
+          <a:ln w="28575">
+            <a:solidFill>
+              <a:schemeClr val="tx1"/>
+            </a:solidFill>
+          </a:ln>
+        </p:spPr>
+        <p:style>
+          <a:lnRef idx="1">
+            <a:schemeClr val="dk1"/>
+          </a:lnRef>
+          <a:fillRef idx="0">
+            <a:schemeClr val="dk1"/>
+          </a:fillRef>
+          <a:effectRef idx="0">
+            <a:schemeClr val="dk1"/>
+          </a:effectRef>
+          <a:fontRef idx="minor">
+            <a:schemeClr val="tx1"/>
+          </a:fontRef>
+        </p:style>
+      </p:cxnSp>
+      <p:cxnSp>
+        <p:nvCxnSpPr>
+          <p:cNvPr id="36" name="Straight Connector 35"/>
+          <p:cNvCxnSpPr/>
+          <p:nvPr/>
+        </p:nvCxnSpPr>
+        <p:spPr>
+          <a:xfrm>
+            <a:off x="9289192" y="6185821"/>
+            <a:ext cx="0" cy="640080"/>
+          </a:xfrm>
+          <a:prstGeom prst="line">
+            <a:avLst/>
+          </a:prstGeom>
+          <a:ln w="28575">
+            <a:solidFill>
+              <a:schemeClr val="tx1"/>
+            </a:solidFill>
+          </a:ln>
+        </p:spPr>
+        <p:style>
+          <a:lnRef idx="1">
+            <a:schemeClr val="dk1"/>
+          </a:lnRef>
+          <a:fillRef idx="0">
+            <a:schemeClr val="dk1"/>
+          </a:fillRef>
+          <a:effectRef idx="0">
+            <a:schemeClr val="dk1"/>
+          </a:effectRef>
+          <a:fontRef idx="minor">
+            <a:schemeClr val="tx1"/>
+          </a:fontRef>
+        </p:style>
+      </p:cxnSp>
+      <p:cxnSp>
+        <p:nvCxnSpPr>
+          <p:cNvPr id="37" name="Straight Arrow Connector 36"/>
+          <p:cNvCxnSpPr/>
+          <p:nvPr/>
+        </p:nvCxnSpPr>
+        <p:spPr>
+          <a:xfrm>
+            <a:off x="2888392" y="6505861"/>
+            <a:ext cx="6400800" cy="0"/>
+          </a:xfrm>
+          <a:prstGeom prst="straightConnector1">
+            <a:avLst/>
+          </a:prstGeom>
+          <a:ln w="28575">
+            <a:solidFill>
+              <a:schemeClr val="tx1"/>
+            </a:solidFill>
+            <a:headEnd type="arrow" w="med" len="med"/>
+            <a:tailEnd type="arrow" w="med" len="med"/>
+          </a:ln>
+        </p:spPr>
+        <p:style>
+          <a:lnRef idx="1">
+            <a:schemeClr val="accent1"/>
+          </a:lnRef>
+          <a:fillRef idx="0">
+            <a:schemeClr val="accent1"/>
+          </a:fillRef>
+          <a:effectRef idx="0">
+            <a:schemeClr val="accent1"/>
+          </a:effectRef>
+          <a:fontRef idx="minor">
+            <a:schemeClr val="tx1"/>
+          </a:fontRef>
+        </p:style>
+      </p:cxnSp>
+      <p:sp>
+        <p:nvSpPr>
+          <p:cNvPr id="38" name="TextBox 37"/>
+          <p:cNvSpPr txBox="1"/>
+          <p:nvPr/>
+        </p:nvSpPr>
+        <p:spPr>
+          <a:xfrm>
+            <a:off x="5676788" y="6321195"/>
+            <a:ext cx="824008" cy="369332"/>
+          </a:xfrm>
+          <a:prstGeom prst="rect">
+            <a:avLst/>
+          </a:prstGeom>
+          <a:solidFill>
+            <a:schemeClr val="bg1"/>
+          </a:solidFill>
+        </p:spPr>
+        <p:txBody>
+          <a:bodyPr wrap="none" rtlCol="0">
+            <a:spAutoFit/>
+          </a:bodyPr>
+          <a:lstStyle/>
+          <a:p>
+            <a:r>
+              <a:rPr lang="en-US" u="sng" dirty="0" smtClean="0"/>
+              <a:t>Length</a:t>
+            </a:r>
+            <a:endParaRPr lang="en-US" u="sng" dirty="0"/>
+          </a:p>
+        </p:txBody>
+      </p:sp>
+      <p:cxnSp>
+        <p:nvCxnSpPr>
+          <p:cNvPr id="39" name="Straight Connector 38"/>
+          <p:cNvCxnSpPr/>
+          <p:nvPr/>
+        </p:nvCxnSpPr>
+        <p:spPr>
+          <a:xfrm rot="16200000">
+            <a:off x="1840872" y="1491669"/>
+            <a:ext cx="0" cy="640080"/>
+          </a:xfrm>
+          <a:prstGeom prst="line">
+            <a:avLst/>
+          </a:prstGeom>
+          <a:ln w="28575">
+            <a:solidFill>
+              <a:schemeClr val="tx1"/>
+            </a:solidFill>
+          </a:ln>
+        </p:spPr>
+        <p:style>
+          <a:lnRef idx="1">
+            <a:schemeClr val="dk1"/>
+          </a:lnRef>
+          <a:fillRef idx="0">
+            <a:schemeClr val="dk1"/>
+          </a:fillRef>
+          <a:effectRef idx="0">
+            <a:schemeClr val="dk1"/>
+          </a:effectRef>
+          <a:fontRef idx="minor">
+            <a:schemeClr val="tx1"/>
+          </a:fontRef>
+        </p:style>
+      </p:cxnSp>
+      <p:cxnSp>
+        <p:nvCxnSpPr>
+          <p:cNvPr id="40" name="Straight Connector 39"/>
+          <p:cNvCxnSpPr/>
+          <p:nvPr/>
+        </p:nvCxnSpPr>
+        <p:spPr>
+          <a:xfrm rot="16200000">
+            <a:off x="1850397" y="5587419"/>
+            <a:ext cx="0" cy="640080"/>
+          </a:xfrm>
+          <a:prstGeom prst="line">
+            <a:avLst/>
+          </a:prstGeom>
+          <a:ln w="28575">
+            <a:solidFill>
+              <a:schemeClr val="tx1"/>
+            </a:solidFill>
+          </a:ln>
+        </p:spPr>
+        <p:style>
+          <a:lnRef idx="1">
+            <a:schemeClr val="dk1"/>
+          </a:lnRef>
+          <a:fillRef idx="0">
+            <a:schemeClr val="dk1"/>
+          </a:fillRef>
+          <a:effectRef idx="0">
+            <a:schemeClr val="dk1"/>
+          </a:effectRef>
+          <a:fontRef idx="minor">
+            <a:schemeClr val="tx1"/>
+          </a:fontRef>
+        </p:style>
+      </p:cxnSp>
+      <p:cxnSp>
+        <p:nvCxnSpPr>
+          <p:cNvPr id="41" name="Straight Arrow Connector 40"/>
+          <p:cNvCxnSpPr/>
+          <p:nvPr/>
+        </p:nvCxnSpPr>
+        <p:spPr>
+          <a:xfrm rot="16200000">
+            <a:off x="-172713" y="3851963"/>
+            <a:ext cx="4023360" cy="0"/>
+          </a:xfrm>
+          <a:prstGeom prst="straightConnector1">
+            <a:avLst/>
+          </a:prstGeom>
+          <a:ln w="28575">
+            <a:solidFill>
+              <a:schemeClr val="tx1"/>
+            </a:solidFill>
+            <a:headEnd type="arrow" w="med" len="med"/>
+            <a:tailEnd type="arrow" w="med" len="med"/>
+          </a:ln>
+        </p:spPr>
+        <p:style>
+          <a:lnRef idx="1">
+            <a:schemeClr val="accent1"/>
+          </a:lnRef>
+          <a:fillRef idx="0">
+            <a:schemeClr val="accent1"/>
+          </a:fillRef>
+          <a:effectRef idx="0">
+            <a:schemeClr val="accent1"/>
+          </a:effectRef>
+          <a:fontRef idx="minor">
+            <a:schemeClr val="tx1"/>
+          </a:fontRef>
+        </p:style>
+      </p:cxnSp>
+      <p:sp>
+        <p:nvSpPr>
+          <p:cNvPr id="42" name="TextBox 41"/>
+          <p:cNvSpPr txBox="1"/>
+          <p:nvPr/>
+        </p:nvSpPr>
+        <p:spPr>
+          <a:xfrm rot="16200000">
+            <a:off x="1468722" y="3553896"/>
+            <a:ext cx="763351" cy="369332"/>
+          </a:xfrm>
+          <a:prstGeom prst="rect">
+            <a:avLst/>
+          </a:prstGeom>
+          <a:solidFill>
+            <a:schemeClr val="bg1"/>
+          </a:solidFill>
+        </p:spPr>
+        <p:txBody>
+          <a:bodyPr wrap="none" rtlCol="0">
+            <a:spAutoFit/>
+          </a:bodyPr>
+          <a:lstStyle/>
+          <a:p>
+            <a:r>
+              <a:rPr lang="en-US" u="sng" dirty="0" smtClean="0"/>
+              <a:t>Width</a:t>
+            </a:r>
+            <a:endParaRPr lang="en-US" u="sng" dirty="0"/>
+          </a:p>
+        </p:txBody>
+      </p:sp>
+      <p:sp>
+        <p:nvSpPr>
+          <p:cNvPr id="11" name="TextBox 10"/>
+          <p:cNvSpPr txBox="1"/>
+          <p:nvPr/>
+        </p:nvSpPr>
+        <p:spPr>
+          <a:xfrm>
+            <a:off x="2146009" y="1246996"/>
+            <a:ext cx="301686" cy="369332"/>
+          </a:xfrm>
+          <a:prstGeom prst="rect">
+            <a:avLst/>
+          </a:prstGeom>
+          <a:noFill/>
+        </p:spPr>
+        <p:txBody>
+          <a:bodyPr wrap="none" rtlCol="0">
+            <a:spAutoFit/>
+          </a:bodyPr>
+          <a:lstStyle/>
+          <a:p>
+            <a:r>
+              <a:rPr lang="en-US" dirty="0" smtClean="0"/>
+              <a:t>2</a:t>
+            </a:r>
+            <a:endParaRPr lang="en-US" dirty="0"/>
+          </a:p>
+        </p:txBody>
+      </p:sp>
+      <p:sp>
+        <p:nvSpPr>
+          <p:cNvPr id="43" name="TextBox 42"/>
+          <p:cNvSpPr txBox="1"/>
+          <p:nvPr/>
+        </p:nvSpPr>
+        <p:spPr>
+          <a:xfrm>
+            <a:off x="10125342" y="1366778"/>
+            <a:ext cx="301686" cy="369332"/>
+          </a:xfrm>
+          <a:prstGeom prst="rect">
+            <a:avLst/>
+          </a:prstGeom>
+          <a:noFill/>
+        </p:spPr>
+        <p:txBody>
+          <a:bodyPr wrap="none" rtlCol="0">
+            <a:spAutoFit/>
+          </a:bodyPr>
+          <a:lstStyle/>
+          <a:p>
+            <a:r>
+              <a:rPr lang="en-US" dirty="0" smtClean="0"/>
+              <a:t>1</a:t>
+            </a:r>
+            <a:endParaRPr lang="en-US" dirty="0"/>
+          </a:p>
+        </p:txBody>
+      </p:sp>
+      <p:sp>
+        <p:nvSpPr>
+          <p:cNvPr id="44" name="TextBox 43"/>
+          <p:cNvSpPr txBox="1"/>
+          <p:nvPr/>
+        </p:nvSpPr>
+        <p:spPr>
+          <a:xfrm>
+            <a:off x="2292038" y="6198113"/>
+            <a:ext cx="301686" cy="369332"/>
+          </a:xfrm>
+          <a:prstGeom prst="rect">
+            <a:avLst/>
+          </a:prstGeom>
+          <a:noFill/>
+        </p:spPr>
+        <p:txBody>
+          <a:bodyPr wrap="none" rtlCol="0">
+            <a:spAutoFit/>
+          </a:bodyPr>
+          <a:lstStyle/>
+          <a:p>
+            <a:r>
+              <a:rPr lang="en-US" dirty="0" smtClean="0"/>
+              <a:t>3</a:t>
+            </a:r>
+            <a:endParaRPr lang="en-US" dirty="0"/>
+          </a:p>
+        </p:txBody>
+      </p:sp>
+      <p:sp>
+        <p:nvSpPr>
+          <p:cNvPr id="45" name="TextBox 44"/>
+          <p:cNvSpPr txBox="1"/>
+          <p:nvPr/>
+        </p:nvSpPr>
+        <p:spPr>
+          <a:xfrm>
+            <a:off x="9823656" y="6084482"/>
+            <a:ext cx="301686" cy="369332"/>
+          </a:xfrm>
+          <a:prstGeom prst="rect">
+            <a:avLst/>
+          </a:prstGeom>
+          <a:noFill/>
+        </p:spPr>
+        <p:txBody>
+          <a:bodyPr wrap="none" rtlCol="0">
+            <a:spAutoFit/>
+          </a:bodyPr>
+          <a:lstStyle/>
+          <a:p>
+            <a:r>
+              <a:rPr lang="en-US" smtClean="0"/>
+              <a:t>4</a:t>
+            </a:r>
+            <a:endParaRPr lang="en-US" dirty="0"/>
+          </a:p>
+        </p:txBody>
+      </p:sp>
+      <p:grpSp>
+        <p:nvGrpSpPr>
+          <p:cNvPr id="56" name="Group 55"/>
+          <p:cNvGrpSpPr/>
+          <p:nvPr/>
+        </p:nvGrpSpPr>
+        <p:grpSpPr>
+          <a:xfrm>
+            <a:off x="6004560" y="2506440"/>
+            <a:ext cx="182880" cy="2672653"/>
+            <a:chOff x="5910030" y="2506440"/>
+            <a:chExt cx="182880" cy="2672653"/>
+          </a:xfrm>
+        </p:grpSpPr>
+        <p:sp>
+          <p:nvSpPr>
+            <p:cNvPr id="49" name="Oval 48"/>
+            <p:cNvSpPr/>
+            <p:nvPr/>
+          </p:nvSpPr>
+          <p:spPr>
+            <a:xfrm>
+              <a:off x="5910030" y="2506440"/>
+              <a:ext cx="182880" cy="182880"/>
+            </a:xfrm>
+            <a:prstGeom prst="ellipse">
+              <a:avLst/>
+            </a:prstGeom>
+            <a:solidFill>
+              <a:schemeClr val="bg1"/>
+            </a:solidFill>
+          </p:spPr>
+          <p:style>
+            <a:lnRef idx="2">
+              <a:schemeClr val="accent1">
+                <a:shade val="50000"/>
+              </a:schemeClr>
+            </a:lnRef>
+            <a:fillRef idx="1">
+              <a:schemeClr val="accent1"/>
+            </a:fillRef>
+            <a:effectRef idx="0">
+              <a:schemeClr val="accent1"/>
+            </a:effectRef>
+            <a:fontRef idx="minor">
+              <a:schemeClr val="lt1"/>
+            </a:fontRef>
+          </p:style>
+          <p:txBody>
+            <a:bodyPr rtlCol="0" anchor="ctr"/>
+            <a:lstStyle/>
+            <a:p>
+              <a:pPr algn="ctr"/>
+              <a:endParaRPr lang="en-US"/>
+            </a:p>
+          </p:txBody>
+        </p:sp>
+        <p:sp>
+          <p:nvSpPr>
+            <p:cNvPr id="50" name="Oval 49"/>
+            <p:cNvSpPr/>
+            <p:nvPr/>
+          </p:nvSpPr>
+          <p:spPr>
+            <a:xfrm>
+              <a:off x="5910030" y="3751327"/>
+              <a:ext cx="182880" cy="182880"/>
+            </a:xfrm>
+            <a:prstGeom prst="ellipse">
+              <a:avLst/>
+            </a:prstGeom>
+            <a:solidFill>
+              <a:schemeClr val="bg1"/>
+            </a:solidFill>
+          </p:spPr>
+          <p:style>
+            <a:lnRef idx="2">
+              <a:schemeClr val="accent1">
+                <a:shade val="50000"/>
+              </a:schemeClr>
+            </a:lnRef>
+            <a:fillRef idx="1">
+              <a:schemeClr val="accent1"/>
+            </a:fillRef>
+            <a:effectRef idx="0">
+              <a:schemeClr val="accent1"/>
+            </a:effectRef>
+            <a:fontRef idx="minor">
+              <a:schemeClr val="lt1"/>
+            </a:fontRef>
+          </p:style>
+          <p:txBody>
+            <a:bodyPr rtlCol="0" anchor="ctr"/>
+            <a:lstStyle/>
+            <a:p>
+              <a:pPr algn="ctr"/>
+              <a:endParaRPr lang="en-US"/>
+            </a:p>
+          </p:txBody>
+        </p:sp>
+        <p:sp>
+          <p:nvSpPr>
+            <p:cNvPr id="51" name="Oval 50"/>
+            <p:cNvSpPr/>
+            <p:nvPr/>
+          </p:nvSpPr>
+          <p:spPr>
+            <a:xfrm>
+              <a:off x="5910030" y="4996213"/>
+              <a:ext cx="182880" cy="182880"/>
+            </a:xfrm>
+            <a:prstGeom prst="ellipse">
+              <a:avLst/>
+            </a:prstGeom>
+            <a:solidFill>
+              <a:schemeClr val="bg1"/>
+            </a:solidFill>
+          </p:spPr>
+          <p:style>
+            <a:lnRef idx="2">
+              <a:schemeClr val="accent1">
+                <a:shade val="50000"/>
+              </a:schemeClr>
+            </a:lnRef>
+            <a:fillRef idx="1">
+              <a:schemeClr val="accent1"/>
+            </a:fillRef>
+            <a:effectRef idx="0">
+              <a:schemeClr val="accent1"/>
+            </a:effectRef>
+            <a:fontRef idx="minor">
+              <a:schemeClr val="lt1"/>
+            </a:fontRef>
+          </p:style>
+          <p:txBody>
+            <a:bodyPr rtlCol="0" anchor="ctr"/>
+            <a:lstStyle/>
+            <a:p>
+              <a:pPr algn="ctr"/>
+              <a:endParaRPr lang="en-US"/>
+            </a:p>
+          </p:txBody>
+        </p:sp>
+      </p:grpSp>
+      <p:grpSp>
+        <p:nvGrpSpPr>
+          <p:cNvPr id="58" name="Group 57"/>
+          <p:cNvGrpSpPr/>
+          <p:nvPr/>
+        </p:nvGrpSpPr>
+        <p:grpSpPr>
+          <a:xfrm>
+            <a:off x="8102515" y="2505215"/>
+            <a:ext cx="182880" cy="2672653"/>
+            <a:chOff x="5910030" y="2506440"/>
+            <a:chExt cx="182880" cy="2672653"/>
+          </a:xfrm>
+        </p:grpSpPr>
+        <p:sp>
+          <p:nvSpPr>
+            <p:cNvPr id="59" name="Oval 58"/>
+            <p:cNvSpPr/>
+            <p:nvPr/>
+          </p:nvSpPr>
+          <p:spPr>
+            <a:xfrm>
+              <a:off x="5910030" y="2506440"/>
+              <a:ext cx="182880" cy="182880"/>
+            </a:xfrm>
+            <a:prstGeom prst="ellipse">
+              <a:avLst/>
+            </a:prstGeom>
+            <a:solidFill>
+              <a:schemeClr val="bg1"/>
+            </a:solidFill>
+          </p:spPr>
+          <p:style>
+            <a:lnRef idx="2">
+              <a:schemeClr val="accent1">
+                <a:shade val="50000"/>
+              </a:schemeClr>
+            </a:lnRef>
+            <a:fillRef idx="1">
+              <a:schemeClr val="accent1"/>
+            </a:fillRef>
+            <a:effectRef idx="0">
+              <a:schemeClr val="accent1"/>
+            </a:effectRef>
+            <a:fontRef idx="minor">
+              <a:schemeClr val="lt1"/>
+            </a:fontRef>
+          </p:style>
+          <p:txBody>
+            <a:bodyPr rtlCol="0" anchor="ctr"/>
+            <a:lstStyle/>
+            <a:p>
+              <a:pPr algn="ctr"/>
+              <a:endParaRPr lang="en-US"/>
+            </a:p>
+          </p:txBody>
+        </p:sp>
+        <p:sp>
+          <p:nvSpPr>
+            <p:cNvPr id="60" name="Oval 59"/>
+            <p:cNvSpPr/>
+            <p:nvPr/>
+          </p:nvSpPr>
+          <p:spPr>
+            <a:xfrm>
+              <a:off x="5910030" y="3751327"/>
+              <a:ext cx="182880" cy="182880"/>
+            </a:xfrm>
+            <a:prstGeom prst="ellipse">
+              <a:avLst/>
+            </a:prstGeom>
+            <a:solidFill>
+              <a:schemeClr val="bg1"/>
+            </a:solidFill>
+          </p:spPr>
+          <p:style>
+            <a:lnRef idx="2">
+              <a:schemeClr val="accent1">
+                <a:shade val="50000"/>
+              </a:schemeClr>
+            </a:lnRef>
+            <a:fillRef idx="1">
+              <a:schemeClr val="accent1"/>
+            </a:fillRef>
+            <a:effectRef idx="0">
+              <a:schemeClr val="accent1"/>
+            </a:effectRef>
+            <a:fontRef idx="minor">
+              <a:schemeClr val="lt1"/>
+            </a:fontRef>
+          </p:style>
+          <p:txBody>
+            <a:bodyPr rtlCol="0" anchor="ctr"/>
+            <a:lstStyle/>
+            <a:p>
+              <a:pPr algn="ctr"/>
+              <a:endParaRPr lang="en-US"/>
+            </a:p>
+          </p:txBody>
+        </p:sp>
+        <p:sp>
+          <p:nvSpPr>
+            <p:cNvPr id="61" name="Oval 60"/>
+            <p:cNvSpPr/>
+            <p:nvPr/>
+          </p:nvSpPr>
+          <p:spPr>
+            <a:xfrm>
+              <a:off x="5910030" y="4996213"/>
+              <a:ext cx="182880" cy="182880"/>
+            </a:xfrm>
+            <a:prstGeom prst="ellipse">
+              <a:avLst/>
+            </a:prstGeom>
+            <a:solidFill>
+              <a:schemeClr val="bg1"/>
+            </a:solidFill>
+          </p:spPr>
+          <p:style>
+            <a:lnRef idx="2">
+              <a:schemeClr val="accent1">
+                <a:shade val="50000"/>
+              </a:schemeClr>
+            </a:lnRef>
+            <a:fillRef idx="1">
+              <a:schemeClr val="accent1"/>
+            </a:fillRef>
+            <a:effectRef idx="0">
+              <a:schemeClr val="accent1"/>
+            </a:effectRef>
+            <a:fontRef idx="minor">
+              <a:schemeClr val="lt1"/>
+            </a:fontRef>
+          </p:style>
+          <p:txBody>
+            <a:bodyPr rtlCol="0" anchor="ctr"/>
+            <a:lstStyle/>
+            <a:p>
+              <a:pPr algn="ctr"/>
+              <a:endParaRPr lang="en-US"/>
+            </a:p>
+          </p:txBody>
+        </p:sp>
+      </p:grpSp>
+      <p:grpSp>
+        <p:nvGrpSpPr>
+          <p:cNvPr id="63" name="Group 62"/>
+          <p:cNvGrpSpPr/>
+          <p:nvPr/>
+        </p:nvGrpSpPr>
+        <p:grpSpPr>
+          <a:xfrm>
+            <a:off x="3906605" y="2505215"/>
+            <a:ext cx="182880" cy="2672653"/>
+            <a:chOff x="5910030" y="2506440"/>
+            <a:chExt cx="182880" cy="2672653"/>
+          </a:xfrm>
+        </p:grpSpPr>
+        <p:sp>
+          <p:nvSpPr>
+            <p:cNvPr id="64" name="Oval 63"/>
+            <p:cNvSpPr/>
+            <p:nvPr/>
+          </p:nvSpPr>
+          <p:spPr>
+            <a:xfrm>
+              <a:off x="5910030" y="2506440"/>
+              <a:ext cx="182880" cy="182880"/>
+            </a:xfrm>
+            <a:prstGeom prst="ellipse">
+              <a:avLst/>
+            </a:prstGeom>
+            <a:solidFill>
+              <a:schemeClr val="bg1"/>
+            </a:solidFill>
+          </p:spPr>
+          <p:style>
+            <a:lnRef idx="2">
+              <a:schemeClr val="accent1">
+                <a:shade val="50000"/>
+              </a:schemeClr>
+            </a:lnRef>
+            <a:fillRef idx="1">
+              <a:schemeClr val="accent1"/>
+            </a:fillRef>
+            <a:effectRef idx="0">
+              <a:schemeClr val="accent1"/>
+            </a:effectRef>
+            <a:fontRef idx="minor">
+              <a:schemeClr val="lt1"/>
+            </a:fontRef>
+          </p:style>
+          <p:txBody>
+            <a:bodyPr rtlCol="0" anchor="ctr"/>
+            <a:lstStyle/>
+            <a:p>
+              <a:pPr algn="ctr"/>
+              <a:endParaRPr lang="en-US"/>
+            </a:p>
+          </p:txBody>
+        </p:sp>
+        <p:sp>
+          <p:nvSpPr>
+            <p:cNvPr id="65" name="Oval 64"/>
+            <p:cNvSpPr/>
+            <p:nvPr/>
+          </p:nvSpPr>
+          <p:spPr>
+            <a:xfrm>
+              <a:off x="5910030" y="3751327"/>
+              <a:ext cx="182880" cy="182880"/>
+            </a:xfrm>
+            <a:prstGeom prst="ellipse">
+              <a:avLst/>
+            </a:prstGeom>
+            <a:solidFill>
+              <a:schemeClr val="bg1"/>
+            </a:solidFill>
+          </p:spPr>
+          <p:style>
+            <a:lnRef idx="2">
+              <a:schemeClr val="accent1">
+                <a:shade val="50000"/>
+              </a:schemeClr>
+            </a:lnRef>
+            <a:fillRef idx="1">
+              <a:schemeClr val="accent1"/>
+            </a:fillRef>
+            <a:effectRef idx="0">
+              <a:schemeClr val="accent1"/>
+            </a:effectRef>
+            <a:fontRef idx="minor">
+              <a:schemeClr val="lt1"/>
+            </a:fontRef>
+          </p:style>
+          <p:txBody>
+            <a:bodyPr rtlCol="0" anchor="ctr"/>
+            <a:lstStyle/>
+            <a:p>
+              <a:pPr algn="ctr"/>
+              <a:endParaRPr lang="en-US"/>
+            </a:p>
+          </p:txBody>
+        </p:sp>
+        <p:sp>
+          <p:nvSpPr>
+            <p:cNvPr id="66" name="Oval 65"/>
+            <p:cNvSpPr/>
+            <p:nvPr/>
+          </p:nvSpPr>
+          <p:spPr>
+            <a:xfrm>
+              <a:off x="5910030" y="4996213"/>
+              <a:ext cx="182880" cy="182880"/>
+            </a:xfrm>
+            <a:prstGeom prst="ellipse">
+              <a:avLst/>
+            </a:prstGeom>
+            <a:solidFill>
+              <a:schemeClr val="bg1"/>
+            </a:solidFill>
+          </p:spPr>
+          <p:style>
+            <a:lnRef idx="2">
+              <a:schemeClr val="accent1">
+                <a:shade val="50000"/>
+              </a:schemeClr>
+            </a:lnRef>
+            <a:fillRef idx="1">
+              <a:schemeClr val="accent1"/>
+            </a:fillRef>
+            <a:effectRef idx="0">
+              <a:schemeClr val="accent1"/>
+            </a:effectRef>
+            <a:fontRef idx="minor">
+              <a:schemeClr val="lt1"/>
+            </a:fontRef>
+          </p:style>
+          <p:txBody>
+            <a:bodyPr rtlCol="0" anchor="ctr"/>
+            <a:lstStyle/>
+            <a:p>
+              <a:pPr algn="ctr"/>
+              <a:endParaRPr lang="en-US"/>
+            </a:p>
+          </p:txBody>
+        </p:sp>
+      </p:grpSp>
+    </p:spTree>
+    <p:extLst>
+      <p:ext uri="{BB962C8B-B14F-4D97-AF65-F5344CB8AC3E}">
+        <p14:creationId xmlns:p14="http://schemas.microsoft.com/office/powerpoint/2010/main" val="147142485"/>
+      </p:ext>
+    </p:extLst>
+  </p:cSld>
+  <p:clrMapOvr>
+    <a:masterClrMapping/>
+  </p:clrMapOvr>
+</p:sld>
+</file>
+
+<file path=ppt/slides/slide9.xml><?xml version="1.0" encoding="utf-8"?>
+<p:sld xmlns:a="http://schemas.openxmlformats.org/drawingml/2006/main" xmlns:r="http://schemas.openxmlformats.org/officeDocument/2006/relationships" xmlns:p="http://schemas.openxmlformats.org/presentationml/2006/main">
+  <p:cSld>
+    <p:spTree>
+      <p:nvGrpSpPr>
+        <p:cNvPr id="1" name=""/>
+        <p:cNvGrpSpPr/>
+        <p:nvPr/>
+      </p:nvGrpSpPr>
+      <p:grpSpPr>
+        <a:xfrm>
+          <a:off x="0" y="0"/>
+          <a:ext cx="0" cy="0"/>
+          <a:chOff x="0" y="0"/>
+          <a:chExt cx="0" cy="0"/>
+        </a:xfrm>
+      </p:grpSpPr>
+      <p:sp>
+        <p:nvSpPr>
+          <p:cNvPr id="2" name="Title 1"/>
+          <p:cNvSpPr>
+            <a:spLocks noGrp="1"/>
+          </p:cNvSpPr>
+          <p:nvPr>
+            <p:ph type="title"/>
+          </p:nvPr>
+        </p:nvSpPr>
+        <p:spPr/>
+        <p:txBody>
+          <a:bodyPr/>
+          <a:lstStyle/>
+          <a:p>
+            <a:r>
+              <a:rPr lang="en-US" dirty="0" smtClean="0"/>
+              <a:t>MATLAB Limited (8 max) Lights</a:t>
+            </a:r>
+            <a:endParaRPr lang="en-US" dirty="0"/>
+          </a:p>
+        </p:txBody>
+      </p:sp>
+      <p:grpSp>
+        <p:nvGrpSpPr>
+          <p:cNvPr id="3" name="Group 2"/>
+          <p:cNvGrpSpPr/>
+          <p:nvPr/>
+        </p:nvGrpSpPr>
+        <p:grpSpPr>
+          <a:xfrm>
+            <a:off x="2895600" y="1125910"/>
+            <a:ext cx="6400800" cy="4800599"/>
+            <a:chOff x="2895600" y="1125910"/>
+            <a:chExt cx="6400800" cy="4800599"/>
+          </a:xfrm>
+        </p:grpSpPr>
+        <p:sp>
+          <p:nvSpPr>
+            <p:cNvPr id="4" name="Rectangle 3"/>
+            <p:cNvSpPr/>
+            <p:nvPr/>
+          </p:nvSpPr>
+          <p:spPr>
+            <a:xfrm>
+              <a:off x="2895600" y="1811709"/>
+              <a:ext cx="6400800" cy="4114800"/>
+            </a:xfrm>
+            <a:prstGeom prst="rect">
+              <a:avLst/>
+            </a:prstGeom>
+          </p:spPr>
+          <p:style>
+            <a:lnRef idx="2">
+              <a:schemeClr val="accent1">
+                <a:shade val="50000"/>
+              </a:schemeClr>
+            </a:lnRef>
+            <a:fillRef idx="1">
+              <a:schemeClr val="accent1"/>
+            </a:fillRef>
+            <a:effectRef idx="0">
+              <a:schemeClr val="accent1"/>
+            </a:effectRef>
+            <a:fontRef idx="minor">
+              <a:schemeClr val="lt1"/>
+            </a:fontRef>
+          </p:style>
+          <p:txBody>
+            <a:bodyPr rtlCol="0" anchor="ctr"/>
+            <a:lstStyle/>
+            <a:p>
+              <a:pPr algn="ctr"/>
+              <a:endParaRPr lang="en-US"/>
+            </a:p>
+          </p:txBody>
+        </p:sp>
+        <p:sp>
+          <p:nvSpPr>
+            <p:cNvPr id="5" name="Arc 4"/>
+            <p:cNvSpPr/>
+            <p:nvPr/>
+          </p:nvSpPr>
+          <p:spPr>
+            <a:xfrm rot="5400000">
+              <a:off x="3694007" y="1128046"/>
+              <a:ext cx="1371600" cy="1367327"/>
+            </a:xfrm>
+            <a:prstGeom prst="arc">
+              <a:avLst/>
+            </a:prstGeom>
+            <a:solidFill>
+              <a:schemeClr val="bg1"/>
+            </a:solidFill>
+            <a:ln>
+              <a:noFill/>
+            </a:ln>
+          </p:spPr>
+          <p:style>
+            <a:lnRef idx="1">
+              <a:schemeClr val="accent1"/>
+            </a:lnRef>
+            <a:fillRef idx="0">
+              <a:schemeClr val="accent1"/>
+            </a:fillRef>
+            <a:effectRef idx="0">
+              <a:schemeClr val="accent1"/>
+            </a:effectRef>
+            <a:fontRef idx="minor">
+              <a:schemeClr val="tx1"/>
+            </a:fontRef>
+          </p:style>
+          <p:txBody>
+            <a:bodyPr rtlCol="0" anchor="ctr"/>
+            <a:lstStyle/>
+            <a:p>
+              <a:pPr algn="ctr"/>
+              <a:endParaRPr lang="en-US"/>
+            </a:p>
+          </p:txBody>
+        </p:sp>
+        <p:sp>
+          <p:nvSpPr>
+            <p:cNvPr id="6" name="Arc 5"/>
+            <p:cNvSpPr/>
+            <p:nvPr/>
+          </p:nvSpPr>
+          <p:spPr>
+            <a:xfrm rot="16200000" flipH="1">
+              <a:off x="5063471" y="1436424"/>
+              <a:ext cx="731520" cy="731520"/>
+            </a:xfrm>
+            <a:prstGeom prst="arc">
+              <a:avLst/>
+            </a:prstGeom>
+            <a:solidFill>
+              <a:schemeClr val="bg1"/>
+            </a:solidFill>
+            <a:ln>
+              <a:noFill/>
+            </a:ln>
+          </p:spPr>
+          <p:style>
+            <a:lnRef idx="1">
+              <a:schemeClr val="accent1"/>
+            </a:lnRef>
+            <a:fillRef idx="0">
+              <a:schemeClr val="accent1"/>
+            </a:fillRef>
+            <a:effectRef idx="0">
+              <a:schemeClr val="accent1"/>
+            </a:effectRef>
+            <a:fontRef idx="minor">
+              <a:schemeClr val="tx1"/>
+            </a:fontRef>
+          </p:style>
+          <p:txBody>
+            <a:bodyPr rtlCol="0" anchor="ctr"/>
+            <a:lstStyle/>
+            <a:p>
+              <a:pPr algn="ctr"/>
+              <a:endParaRPr lang="en-US"/>
+            </a:p>
+          </p:txBody>
+        </p:sp>
+      </p:grpSp>
+      <p:sp>
+        <p:nvSpPr>
+          <p:cNvPr id="7" name="TextBox 6"/>
+          <p:cNvSpPr txBox="1"/>
+          <p:nvPr/>
+        </p:nvSpPr>
+        <p:spPr>
+          <a:xfrm>
+            <a:off x="5112017" y="6013447"/>
+            <a:ext cx="2190215" cy="369332"/>
+          </a:xfrm>
+          <a:prstGeom prst="rect">
+            <a:avLst/>
+          </a:prstGeom>
+          <a:noFill/>
+        </p:spPr>
+        <p:txBody>
+          <a:bodyPr wrap="none" rtlCol="0">
+            <a:spAutoFit/>
+          </a:bodyPr>
+          <a:lstStyle/>
+          <a:p>
+            <a:r>
+              <a:rPr lang="en-US" dirty="0" smtClean="0"/>
+              <a:t>Northwest (NW) Wall</a:t>
+            </a:r>
+            <a:endParaRPr lang="en-US" dirty="0"/>
+          </a:p>
+        </p:txBody>
+      </p:sp>
+      <p:sp>
+        <p:nvSpPr>
+          <p:cNvPr id="8" name="TextBox 7"/>
+          <p:cNvSpPr txBox="1"/>
+          <p:nvPr/>
+        </p:nvSpPr>
+        <p:spPr>
+          <a:xfrm>
+            <a:off x="5206370" y="1431662"/>
+            <a:ext cx="2001510" cy="369332"/>
+          </a:xfrm>
+          <a:prstGeom prst="rect">
+            <a:avLst/>
+          </a:prstGeom>
+          <a:noFill/>
+        </p:spPr>
+        <p:txBody>
+          <a:bodyPr wrap="none" rtlCol="0">
+            <a:spAutoFit/>
+          </a:bodyPr>
+          <a:lstStyle/>
+          <a:p>
+            <a:r>
+              <a:rPr lang="en-US" dirty="0" smtClean="0"/>
+              <a:t>Southeast (SE) Wall</a:t>
+            </a:r>
+            <a:endParaRPr lang="en-US" dirty="0"/>
+          </a:p>
+        </p:txBody>
+      </p:sp>
+      <p:sp>
+        <p:nvSpPr>
+          <p:cNvPr id="9" name="TextBox 8"/>
+          <p:cNvSpPr txBox="1"/>
+          <p:nvPr/>
+        </p:nvSpPr>
+        <p:spPr>
+          <a:xfrm rot="16200000">
+            <a:off x="1651905" y="3571473"/>
+            <a:ext cx="2046394" cy="369332"/>
+          </a:xfrm>
+          <a:prstGeom prst="rect">
+            <a:avLst/>
+          </a:prstGeom>
+          <a:noFill/>
+        </p:spPr>
+        <p:txBody>
+          <a:bodyPr wrap="none" rtlCol="0">
+            <a:spAutoFit/>
+          </a:bodyPr>
+          <a:lstStyle/>
+          <a:p>
+            <a:r>
+              <a:rPr lang="en-US" dirty="0" smtClean="0"/>
+              <a:t>Northeast (NE) Wall</a:t>
+            </a:r>
+            <a:endParaRPr lang="en-US" dirty="0"/>
+          </a:p>
+        </p:txBody>
+      </p:sp>
+      <p:sp>
+        <p:nvSpPr>
+          <p:cNvPr id="10" name="TextBox 9"/>
+          <p:cNvSpPr txBox="1"/>
+          <p:nvPr/>
+        </p:nvSpPr>
+        <p:spPr>
+          <a:xfrm rot="16200000">
+            <a:off x="8480905" y="3552845"/>
+            <a:ext cx="2143664" cy="369332"/>
+          </a:xfrm>
+          <a:prstGeom prst="rect">
+            <a:avLst/>
+          </a:prstGeom>
+          <a:noFill/>
+        </p:spPr>
+        <p:txBody>
+          <a:bodyPr wrap="none" rtlCol="0">
+            <a:spAutoFit/>
+          </a:bodyPr>
+          <a:lstStyle/>
+          <a:p>
+            <a:r>
+              <a:rPr lang="en-US" dirty="0" smtClean="0"/>
+              <a:t>Southwest (SW) Wall</a:t>
+            </a:r>
+            <a:endParaRPr lang="en-US" dirty="0"/>
+          </a:p>
+        </p:txBody>
+      </p:sp>
+      <p:cxnSp>
+        <p:nvCxnSpPr>
+          <p:cNvPr id="12" name="Straight Arrow Connector 11"/>
+          <p:cNvCxnSpPr/>
+          <p:nvPr/>
+        </p:nvCxnSpPr>
+        <p:spPr>
+          <a:xfrm flipH="1">
+            <a:off x="7933346" y="5926509"/>
+            <a:ext cx="1371600" cy="0"/>
+          </a:xfrm>
+          <a:prstGeom prst="straightConnector1">
+            <a:avLst/>
+          </a:prstGeom>
+          <a:ln w="57150">
+            <a:solidFill>
+              <a:srgbClr val="00FF00"/>
+            </a:solidFill>
+            <a:headEnd type="none" w="med" len="med"/>
+            <a:tailEnd type="arrow" w="med" len="med"/>
+          </a:ln>
+        </p:spPr>
+        <p:style>
+          <a:lnRef idx="1">
+            <a:schemeClr val="accent1"/>
+          </a:lnRef>
+          <a:fillRef idx="0">
+            <a:schemeClr val="accent1"/>
+          </a:fillRef>
+          <a:effectRef idx="0">
+            <a:schemeClr val="accent1"/>
+          </a:effectRef>
+          <a:fontRef idx="minor">
+            <a:schemeClr val="tx1"/>
+          </a:fontRef>
+        </p:style>
+      </p:cxnSp>
+      <p:cxnSp>
+        <p:nvCxnSpPr>
+          <p:cNvPr id="14" name="Straight Arrow Connector 13"/>
+          <p:cNvCxnSpPr/>
+          <p:nvPr/>
+        </p:nvCxnSpPr>
+        <p:spPr>
+          <a:xfrm rot="5400000" flipH="1">
+            <a:off x="8610600" y="5250234"/>
+            <a:ext cx="1371600" cy="0"/>
+          </a:xfrm>
+          <a:prstGeom prst="straightConnector1">
+            <a:avLst/>
+          </a:prstGeom>
+          <a:ln w="57150">
+            <a:solidFill>
+              <a:srgbClr val="FF0000"/>
+            </a:solidFill>
+            <a:headEnd type="none" w="med" len="med"/>
+            <a:tailEnd type="arrow" w="med" len="med"/>
+          </a:ln>
+        </p:spPr>
+        <p:style>
+          <a:lnRef idx="1">
+            <a:schemeClr val="accent1"/>
+          </a:lnRef>
+          <a:fillRef idx="0">
+            <a:schemeClr val="accent1"/>
+          </a:fillRef>
+          <a:effectRef idx="0">
+            <a:schemeClr val="accent1"/>
+          </a:effectRef>
+          <a:fontRef idx="minor">
+            <a:schemeClr val="tx1"/>
+          </a:fontRef>
+        </p:style>
+      </p:cxnSp>
+      <mc:AlternateContent xmlns:mc="http://schemas.openxmlformats.org/markup-compatibility/2006" xmlns:a14="http://schemas.microsoft.com/office/drawing/2010/main">
+        <mc:Choice Requires="a14">
+          <p:sp>
+            <p:nvSpPr>
+              <p:cNvPr id="13" name="TextBox 12"/>
+              <p:cNvSpPr txBox="1"/>
+              <p:nvPr/>
+            </p:nvSpPr>
+            <p:spPr>
+              <a:xfrm>
+                <a:off x="8116018" y="5916985"/>
+                <a:ext cx="498855" cy="369332"/>
+              </a:xfrm>
+              <a:prstGeom prst="rect">
+                <a:avLst/>
+              </a:prstGeom>
+              <a:noFill/>
+            </p:spPr>
+            <p:txBody>
+              <a:bodyPr wrap="none" rtlCol="0">
+                <a:spAutoFit/>
+              </a:bodyPr>
+              <a:lstStyle/>
+              <a:p>
+                <a:pPr/>
+                <a14:m>
+                  <m:oMathPara xmlns:m="http://schemas.openxmlformats.org/officeDocument/2006/math">
+                    <m:oMathParaPr>
+                      <m:jc m:val="centerGroup"/>
+                    </m:oMathParaPr>
+                    <m:oMath xmlns:m="http://schemas.openxmlformats.org/officeDocument/2006/math">
+                      <m:sSub>
+                        <m:sSubPr>
+                          <m:ctrlPr>
+                            <a:rPr lang="en-US" b="0" i="1" smtClean="0">
+                              <a:latin typeface="Cambria Math" panose="02040503050406030204" pitchFamily="18" charset="0"/>
+                            </a:rPr>
+                          </m:ctrlPr>
+                        </m:sSubPr>
+                        <m:e>
+                          <m:r>
+                            <a:rPr lang="en-US" b="0" i="1" smtClean="0">
+                              <a:latin typeface="Cambria Math" panose="02040503050406030204" pitchFamily="18" charset="0"/>
+                            </a:rPr>
+                            <m:t>𝑦</m:t>
+                          </m:r>
+                        </m:e>
+                        <m:sub>
+                          <m:r>
+                            <a:rPr lang="en-US" b="0" i="1" smtClean="0">
+                              <a:latin typeface="Cambria Math" panose="02040503050406030204" pitchFamily="18" charset="0"/>
+                            </a:rPr>
+                            <m:t>𝑤</m:t>
+                          </m:r>
+                        </m:sub>
+                      </m:sSub>
+                    </m:oMath>
+                  </m:oMathPara>
+                </a14:m>
+                <a:endParaRPr lang="en-US" dirty="0"/>
+              </a:p>
+            </p:txBody>
+          </p:sp>
+        </mc:Choice>
+        <mc:Fallback xmlns="">
+          <p:sp>
+            <p:nvSpPr>
+              <p:cNvPr id="13" name="TextBox 12"/>
+              <p:cNvSpPr txBox="1">
+                <a:spLocks noRot="1" noChangeAspect="1" noMove="1" noResize="1" noEditPoints="1" noAdjustHandles="1" noChangeArrowheads="1" noChangeShapeType="1" noTextEdit="1"/>
+              </p:cNvSpPr>
+              <p:nvPr/>
+            </p:nvSpPr>
+            <p:spPr>
+              <a:xfrm>
+                <a:off x="8116018" y="5916985"/>
+                <a:ext cx="498855" cy="369332"/>
+              </a:xfrm>
+              <a:prstGeom prst="rect">
+                <a:avLst/>
+              </a:prstGeom>
+              <a:blipFill>
+                <a:blip r:embed="rId3"/>
+                <a:stretch>
+                  <a:fillRect b="-6667"/>
+                </a:stretch>
+              </a:blipFill>
+            </p:spPr>
+            <p:txBody>
+              <a:bodyPr/>
+              <a:lstStyle/>
+              <a:p>
+                <a:r>
+                  <a:rPr lang="en-US">
+                    <a:noFill/>
+                  </a:rPr>
+                  <a:t> </a:t>
+                </a:r>
+              </a:p>
+            </p:txBody>
+          </p:sp>
+        </mc:Fallback>
+      </mc:AlternateContent>
+      <mc:AlternateContent xmlns:mc="http://schemas.openxmlformats.org/markup-compatibility/2006" xmlns:a14="http://schemas.microsoft.com/office/drawing/2010/main">
+        <mc:Choice Requires="a14">
+          <p:sp>
+            <p:nvSpPr>
+              <p:cNvPr id="16" name="TextBox 15"/>
+              <p:cNvSpPr txBox="1"/>
+              <p:nvPr/>
+            </p:nvSpPr>
+            <p:spPr>
+              <a:xfrm>
+                <a:off x="9260795" y="4750761"/>
+                <a:ext cx="510460" cy="369332"/>
+              </a:xfrm>
+              <a:prstGeom prst="rect">
+                <a:avLst/>
+              </a:prstGeom>
+              <a:noFill/>
+            </p:spPr>
+            <p:txBody>
+              <a:bodyPr wrap="none" rtlCol="0">
+                <a:spAutoFit/>
+              </a:bodyPr>
+              <a:lstStyle/>
+              <a:p>
+                <a:pPr/>
+                <a14:m>
+                  <m:oMathPara xmlns:m="http://schemas.openxmlformats.org/officeDocument/2006/math">
+                    <m:oMathParaPr>
+                      <m:jc m:val="centerGroup"/>
+                    </m:oMathParaPr>
+                    <m:oMath xmlns:m="http://schemas.openxmlformats.org/officeDocument/2006/math">
+                      <m:sSub>
+                        <m:sSubPr>
+                          <m:ctrlPr>
+                            <a:rPr lang="en-US" b="0" i="1" smtClean="0">
+                              <a:latin typeface="Cambria Math" panose="02040503050406030204" pitchFamily="18" charset="0"/>
+                            </a:rPr>
+                          </m:ctrlPr>
+                        </m:sSubPr>
+                        <m:e>
+                          <m:r>
+                            <a:rPr lang="en-US" b="0" i="1" smtClean="0">
+                              <a:latin typeface="Cambria Math" panose="02040503050406030204" pitchFamily="18" charset="0"/>
+                            </a:rPr>
+                            <m:t>𝑥</m:t>
+                          </m:r>
+                        </m:e>
+                        <m:sub>
+                          <m:r>
+                            <a:rPr lang="en-US" b="0" i="1" smtClean="0">
+                              <a:latin typeface="Cambria Math" panose="02040503050406030204" pitchFamily="18" charset="0"/>
+                            </a:rPr>
+                            <m:t>𝑤</m:t>
+                          </m:r>
+                        </m:sub>
+                      </m:sSub>
+                    </m:oMath>
+                  </m:oMathPara>
+                </a14:m>
+                <a:endParaRPr lang="en-US" dirty="0"/>
+              </a:p>
+            </p:txBody>
+          </p:sp>
+        </mc:Choice>
+        <mc:Fallback xmlns="">
+          <p:sp>
+            <p:nvSpPr>
+              <p:cNvPr id="16" name="TextBox 15"/>
+              <p:cNvSpPr txBox="1">
+                <a:spLocks noRot="1" noChangeAspect="1" noMove="1" noResize="1" noEditPoints="1" noAdjustHandles="1" noChangeArrowheads="1" noChangeShapeType="1" noTextEdit="1"/>
+              </p:cNvSpPr>
+              <p:nvPr/>
+            </p:nvSpPr>
+            <p:spPr>
+              <a:xfrm>
+                <a:off x="9260795" y="4750761"/>
+                <a:ext cx="510460" cy="369332"/>
+              </a:xfrm>
+              <a:prstGeom prst="rect">
+                <a:avLst/>
+              </a:prstGeom>
+              <a:blipFill>
+                <a:blip r:embed="rId4"/>
+                <a:stretch>
+                  <a:fillRect/>
+                </a:stretch>
+              </a:blipFill>
+            </p:spPr>
+            <p:txBody>
+              <a:bodyPr/>
+              <a:lstStyle/>
+              <a:p>
+                <a:r>
+                  <a:rPr lang="en-US">
+                    <a:noFill/>
+                  </a:rPr>
+                  <a:t> </a:t>
+                </a:r>
+              </a:p>
+            </p:txBody>
+          </p:sp>
+        </mc:Fallback>
+      </mc:AlternateContent>
+      <mc:AlternateContent xmlns:mc="http://schemas.openxmlformats.org/markup-compatibility/2006" xmlns:a14="http://schemas.microsoft.com/office/drawing/2010/main">
+        <mc:Choice Requires="a14">
+          <p:sp>
+            <p:nvSpPr>
+              <p:cNvPr id="17" name="TextBox 16"/>
+              <p:cNvSpPr txBox="1"/>
+              <p:nvPr/>
+            </p:nvSpPr>
+            <p:spPr>
+              <a:xfrm>
+                <a:off x="8905597" y="5935540"/>
+                <a:ext cx="456482" cy="369332"/>
+              </a:xfrm>
+              <a:prstGeom prst="rect">
+                <a:avLst/>
+              </a:prstGeom>
+              <a:noFill/>
+            </p:spPr>
+            <p:txBody>
+              <a:bodyPr wrap="square" rtlCol="0">
+                <a:spAutoFit/>
+              </a:bodyPr>
+              <a:lstStyle/>
+              <a:p>
+                <a:pPr/>
+                <a14:m>
+                  <m:oMathPara xmlns:m="http://schemas.openxmlformats.org/officeDocument/2006/math">
+                    <m:oMathParaPr>
+                      <m:jc m:val="centerGroup"/>
+                    </m:oMathParaPr>
+                    <m:oMath xmlns:m="http://schemas.openxmlformats.org/officeDocument/2006/math">
+                      <m:sSub>
+                        <m:sSubPr>
+                          <m:ctrlPr>
+                            <a:rPr lang="en-US" b="0" i="1" smtClean="0">
+                              <a:latin typeface="Cambria Math" panose="02040503050406030204" pitchFamily="18" charset="0"/>
+                            </a:rPr>
+                          </m:ctrlPr>
+                        </m:sSubPr>
+                        <m:e>
+                          <m:r>
+                            <a:rPr lang="en-US" b="0" i="1" smtClean="0">
+                              <a:latin typeface="Cambria Math" panose="02040503050406030204" pitchFamily="18" charset="0"/>
+                            </a:rPr>
+                            <m:t>𝑜</m:t>
+                          </m:r>
+                        </m:e>
+                        <m:sub>
+                          <m:r>
+                            <a:rPr lang="en-US" b="0" i="1" smtClean="0">
+                              <a:latin typeface="Cambria Math" panose="02040503050406030204" pitchFamily="18" charset="0"/>
+                            </a:rPr>
+                            <m:t>𝑤</m:t>
+                          </m:r>
+                        </m:sub>
+                      </m:sSub>
+                    </m:oMath>
+                  </m:oMathPara>
+                </a14:m>
+                <a:endParaRPr lang="en-US" dirty="0"/>
+              </a:p>
+            </p:txBody>
+          </p:sp>
+        </mc:Choice>
+        <mc:Fallback xmlns="">
+          <p:sp>
+            <p:nvSpPr>
+              <p:cNvPr id="17" name="TextBox 16"/>
+              <p:cNvSpPr txBox="1">
+                <a:spLocks noRot="1" noChangeAspect="1" noMove="1" noResize="1" noEditPoints="1" noAdjustHandles="1" noChangeArrowheads="1" noChangeShapeType="1" noTextEdit="1"/>
+              </p:cNvSpPr>
+              <p:nvPr/>
+            </p:nvSpPr>
+            <p:spPr>
+              <a:xfrm>
+                <a:off x="8905597" y="5935540"/>
+                <a:ext cx="456482" cy="369332"/>
+              </a:xfrm>
+              <a:prstGeom prst="rect">
+                <a:avLst/>
+              </a:prstGeom>
+              <a:blipFill>
+                <a:blip r:embed="rId5"/>
+                <a:stretch>
+                  <a:fillRect/>
+                </a:stretch>
+              </a:blipFill>
+            </p:spPr>
+            <p:txBody>
+              <a:bodyPr/>
+              <a:lstStyle/>
+              <a:p>
+                <a:r>
+                  <a:rPr lang="en-US">
+                    <a:noFill/>
+                  </a:rPr>
+                  <a:t> </a:t>
+                </a:r>
+              </a:p>
+            </p:txBody>
+          </p:sp>
+        </mc:Fallback>
+      </mc:AlternateContent>
+      <p:grpSp>
+        <p:nvGrpSpPr>
+          <p:cNvPr id="19" name="Group 18"/>
+          <p:cNvGrpSpPr/>
+          <p:nvPr/>
+        </p:nvGrpSpPr>
+        <p:grpSpPr>
+          <a:xfrm>
+            <a:off x="2595688" y="5478834"/>
+            <a:ext cx="757112" cy="753362"/>
+            <a:chOff x="2595688" y="5478834"/>
+            <a:chExt cx="757112" cy="753362"/>
+          </a:xfrm>
+        </p:grpSpPr>
+        <p:cxnSp>
+          <p:nvCxnSpPr>
+            <p:cNvPr id="15" name="Straight Arrow Connector 14"/>
+            <p:cNvCxnSpPr/>
+            <p:nvPr/>
+          </p:nvCxnSpPr>
+          <p:spPr>
+            <a:xfrm flipV="1">
+              <a:off x="2895600" y="5936034"/>
+              <a:ext cx="457200" cy="0"/>
+            </a:xfrm>
+            <a:prstGeom prst="straightConnector1">
+              <a:avLst/>
+            </a:prstGeom>
+            <a:ln w="38100">
+              <a:solidFill>
+                <a:srgbClr val="0000FF"/>
+              </a:solidFill>
+              <a:headEnd type="none" w="med" len="med"/>
+              <a:tailEnd type="arrow" w="med" len="med"/>
+            </a:ln>
+          </p:spPr>
+          <p:style>
+            <a:lnRef idx="1">
+              <a:schemeClr val="accent1"/>
+            </a:lnRef>
+            <a:fillRef idx="0">
+              <a:schemeClr val="accent1"/>
+            </a:fillRef>
+            <a:effectRef idx="0">
+              <a:schemeClr val="accent1"/>
+            </a:effectRef>
+            <a:fontRef idx="minor">
+              <a:schemeClr val="tx1"/>
+            </a:fontRef>
+          </p:style>
+        </p:cxnSp>
+        <p:cxnSp>
+          <p:nvCxnSpPr>
+            <p:cNvPr id="18" name="Straight Arrow Connector 17"/>
+            <p:cNvCxnSpPr/>
+            <p:nvPr/>
+          </p:nvCxnSpPr>
+          <p:spPr>
+            <a:xfrm flipH="1" flipV="1">
+              <a:off x="2895599" y="5478834"/>
+              <a:ext cx="0" cy="457200"/>
+            </a:xfrm>
+            <a:prstGeom prst="straightConnector1">
+              <a:avLst/>
+            </a:prstGeom>
+            <a:ln w="38100">
+              <a:solidFill>
+                <a:srgbClr val="FF0000"/>
+              </a:solidFill>
+              <a:headEnd type="none" w="med" len="med"/>
+              <a:tailEnd type="arrow" w="med" len="med"/>
+            </a:ln>
+          </p:spPr>
+          <p:style>
+            <a:lnRef idx="1">
+              <a:schemeClr val="accent1"/>
+            </a:lnRef>
+            <a:fillRef idx="0">
+              <a:schemeClr val="accent1"/>
+            </a:fillRef>
+            <a:effectRef idx="0">
+              <a:schemeClr val="accent1"/>
+            </a:effectRef>
+            <a:fontRef idx="minor">
+              <a:schemeClr val="tx1"/>
+            </a:fontRef>
+          </p:style>
+        </p:cxnSp>
+        <mc:AlternateContent xmlns:mc="http://schemas.openxmlformats.org/markup-compatibility/2006" xmlns:a14="http://schemas.microsoft.com/office/drawing/2010/main">
+          <mc:Choice Requires="a14">
+            <p:sp>
+              <p:nvSpPr>
+                <p:cNvPr id="20" name="TextBox 19"/>
+                <p:cNvSpPr txBox="1"/>
+                <p:nvPr/>
+              </p:nvSpPr>
+              <p:spPr>
+                <a:xfrm>
+                  <a:off x="2595688" y="5862864"/>
+                  <a:ext cx="456482" cy="369332"/>
+                </a:xfrm>
+                <a:prstGeom prst="rect">
+                  <a:avLst/>
+                </a:prstGeom>
+                <a:noFill/>
+              </p:spPr>
+              <p:txBody>
+                <a:bodyPr wrap="square" rtlCol="0">
+                  <a:spAutoFit/>
+                </a:bodyPr>
+                <a:lstStyle/>
+                <a:p>
+                  <a:pPr/>
+                  <a14:m>
+                    <m:oMathPara xmlns:m="http://schemas.openxmlformats.org/officeDocument/2006/math">
+                      <m:oMathParaPr>
+                        <m:jc m:val="centerGroup"/>
+                      </m:oMathParaPr>
+                      <m:oMath xmlns:m="http://schemas.openxmlformats.org/officeDocument/2006/math">
+                        <m:sSub>
+                          <m:sSubPr>
+                            <m:ctrlPr>
+                              <a:rPr lang="en-US" b="0" i="1" smtClean="0">
+                                <a:latin typeface="Cambria Math" panose="02040503050406030204" pitchFamily="18" charset="0"/>
+                              </a:rPr>
+                            </m:ctrlPr>
+                          </m:sSubPr>
+                          <m:e>
+                            <m:r>
+                              <a:rPr lang="en-US" b="0" i="1" smtClean="0">
+                                <a:latin typeface="Cambria Math" panose="02040503050406030204" pitchFamily="18" charset="0"/>
+                              </a:rPr>
+                              <m:t>𝑜</m:t>
+                            </m:r>
+                          </m:e>
+                          <m:sub>
+                            <m:r>
+                              <a:rPr lang="en-US" b="0" i="1" smtClean="0">
+                                <a:latin typeface="Cambria Math" panose="02040503050406030204" pitchFamily="18" charset="0"/>
+                              </a:rPr>
+                              <m:t>𝑁𝐸</m:t>
+                            </m:r>
+                          </m:sub>
+                        </m:sSub>
+                      </m:oMath>
+                    </m:oMathPara>
+                  </a14:m>
+                  <a:endParaRPr lang="en-US" dirty="0"/>
+                </a:p>
+              </p:txBody>
+            </p:sp>
+          </mc:Choice>
+          <mc:Fallback xmlns="">
+            <p:sp>
+              <p:nvSpPr>
+                <p:cNvPr id="20" name="TextBox 19"/>
+                <p:cNvSpPr txBox="1">
+                  <a:spLocks noRot="1" noChangeAspect="1" noMove="1" noResize="1" noEditPoints="1" noAdjustHandles="1" noChangeArrowheads="1" noChangeShapeType="1" noTextEdit="1"/>
+                </p:cNvSpPr>
+                <p:nvPr/>
+              </p:nvSpPr>
+              <p:spPr>
+                <a:xfrm>
+                  <a:off x="2595688" y="5862864"/>
+                  <a:ext cx="456482" cy="369332"/>
+                </a:xfrm>
+                <a:prstGeom prst="rect">
+                  <a:avLst/>
+                </a:prstGeom>
+                <a:blipFill>
+                  <a:blip r:embed="rId6"/>
+                  <a:stretch>
+                    <a:fillRect r="-9333"/>
+                  </a:stretch>
+                </a:blipFill>
+              </p:spPr>
+              <p:txBody>
+                <a:bodyPr/>
+                <a:lstStyle/>
+                <a:p>
+                  <a:r>
+                    <a:rPr lang="en-US">
+                      <a:noFill/>
+                    </a:rPr>
+                    <a:t> </a:t>
+                  </a:r>
+                </a:p>
+              </p:txBody>
+            </p:sp>
+          </mc:Fallback>
+        </mc:AlternateContent>
+      </p:grpSp>
+      <p:grpSp>
+        <p:nvGrpSpPr>
+          <p:cNvPr id="22" name="Group 21"/>
+          <p:cNvGrpSpPr/>
+          <p:nvPr/>
+        </p:nvGrpSpPr>
+        <p:grpSpPr>
+          <a:xfrm rot="5400000">
+            <a:off x="2884104" y="1815460"/>
+            <a:ext cx="457201" cy="457200"/>
+            <a:chOff x="2895599" y="5478834"/>
+            <a:chExt cx="457201" cy="457200"/>
+          </a:xfrm>
+        </p:grpSpPr>
+        <p:cxnSp>
+          <p:nvCxnSpPr>
+            <p:cNvPr id="23" name="Straight Arrow Connector 22"/>
+            <p:cNvCxnSpPr/>
+            <p:nvPr/>
+          </p:nvCxnSpPr>
+          <p:spPr>
+            <a:xfrm flipV="1">
+              <a:off x="2895600" y="5936034"/>
+              <a:ext cx="457200" cy="0"/>
+            </a:xfrm>
+            <a:prstGeom prst="straightConnector1">
+              <a:avLst/>
+            </a:prstGeom>
+            <a:ln w="38100">
+              <a:solidFill>
+                <a:srgbClr val="0000FF"/>
+              </a:solidFill>
+              <a:headEnd type="none" w="med" len="med"/>
+              <a:tailEnd type="arrow" w="med" len="med"/>
+            </a:ln>
+          </p:spPr>
+          <p:style>
+            <a:lnRef idx="1">
+              <a:schemeClr val="accent1"/>
+            </a:lnRef>
+            <a:fillRef idx="0">
+              <a:schemeClr val="accent1"/>
+            </a:fillRef>
+            <a:effectRef idx="0">
+              <a:schemeClr val="accent1"/>
+            </a:effectRef>
+            <a:fontRef idx="minor">
+              <a:schemeClr val="tx1"/>
+            </a:fontRef>
+          </p:style>
+        </p:cxnSp>
+        <p:cxnSp>
+          <p:nvCxnSpPr>
+            <p:cNvPr id="24" name="Straight Arrow Connector 23"/>
+            <p:cNvCxnSpPr/>
+            <p:nvPr/>
+          </p:nvCxnSpPr>
+          <p:spPr>
+            <a:xfrm flipH="1" flipV="1">
+              <a:off x="2895599" y="5478834"/>
+              <a:ext cx="0" cy="457200"/>
+            </a:xfrm>
+            <a:prstGeom prst="straightConnector1">
+              <a:avLst/>
+            </a:prstGeom>
+            <a:ln w="38100">
+              <a:solidFill>
+                <a:srgbClr val="FF0000"/>
+              </a:solidFill>
+              <a:headEnd type="none" w="med" len="med"/>
+              <a:tailEnd type="arrow" w="med" len="med"/>
+            </a:ln>
+          </p:spPr>
+          <p:style>
+            <a:lnRef idx="1">
+              <a:schemeClr val="accent1"/>
+            </a:lnRef>
+            <a:fillRef idx="0">
+              <a:schemeClr val="accent1"/>
+            </a:fillRef>
+            <a:effectRef idx="0">
+              <a:schemeClr val="accent1"/>
+            </a:effectRef>
+            <a:fontRef idx="minor">
+              <a:schemeClr val="tx1"/>
+            </a:fontRef>
+          </p:style>
+        </p:cxnSp>
+      </p:grpSp>
+      <p:grpSp>
+        <p:nvGrpSpPr>
+          <p:cNvPr id="26" name="Group 25"/>
+          <p:cNvGrpSpPr/>
+          <p:nvPr/>
+        </p:nvGrpSpPr>
+        <p:grpSpPr>
+          <a:xfrm rot="10800000">
+            <a:off x="8847745" y="1811708"/>
+            <a:ext cx="457201" cy="457200"/>
+            <a:chOff x="2895599" y="5478834"/>
+            <a:chExt cx="457201" cy="457200"/>
+          </a:xfrm>
+        </p:grpSpPr>
+        <p:cxnSp>
+          <p:nvCxnSpPr>
+            <p:cNvPr id="27" name="Straight Arrow Connector 26"/>
+            <p:cNvCxnSpPr/>
+            <p:nvPr/>
+          </p:nvCxnSpPr>
+          <p:spPr>
+            <a:xfrm flipV="1">
+              <a:off x="2895600" y="5936034"/>
+              <a:ext cx="457200" cy="0"/>
+            </a:xfrm>
+            <a:prstGeom prst="straightConnector1">
+              <a:avLst/>
+            </a:prstGeom>
+            <a:ln w="38100">
+              <a:solidFill>
+                <a:srgbClr val="0000FF"/>
+              </a:solidFill>
+              <a:headEnd type="none" w="med" len="med"/>
+              <a:tailEnd type="arrow" w="med" len="med"/>
+            </a:ln>
+          </p:spPr>
+          <p:style>
+            <a:lnRef idx="1">
+              <a:schemeClr val="accent1"/>
+            </a:lnRef>
+            <a:fillRef idx="0">
+              <a:schemeClr val="accent1"/>
+            </a:fillRef>
+            <a:effectRef idx="0">
+              <a:schemeClr val="accent1"/>
+            </a:effectRef>
+            <a:fontRef idx="minor">
+              <a:schemeClr val="tx1"/>
+            </a:fontRef>
+          </p:style>
+        </p:cxnSp>
+        <p:cxnSp>
+          <p:nvCxnSpPr>
+            <p:cNvPr id="28" name="Straight Arrow Connector 27"/>
+            <p:cNvCxnSpPr/>
+            <p:nvPr/>
+          </p:nvCxnSpPr>
+          <p:spPr>
+            <a:xfrm flipH="1" flipV="1">
+              <a:off x="2895599" y="5478834"/>
+              <a:ext cx="0" cy="457200"/>
+            </a:xfrm>
+            <a:prstGeom prst="straightConnector1">
+              <a:avLst/>
+            </a:prstGeom>
+            <a:ln w="38100">
+              <a:solidFill>
+                <a:srgbClr val="FF0000"/>
+              </a:solidFill>
+              <a:headEnd type="none" w="med" len="med"/>
+              <a:tailEnd type="arrow" w="med" len="med"/>
+            </a:ln>
+          </p:spPr>
+          <p:style>
+            <a:lnRef idx="1">
+              <a:schemeClr val="accent1"/>
+            </a:lnRef>
+            <a:fillRef idx="0">
+              <a:schemeClr val="accent1"/>
+            </a:fillRef>
+            <a:effectRef idx="0">
+              <a:schemeClr val="accent1"/>
+            </a:effectRef>
+            <a:fontRef idx="minor">
+              <a:schemeClr val="tx1"/>
+            </a:fontRef>
+          </p:style>
+        </p:cxnSp>
+      </p:grpSp>
+      <p:grpSp>
+        <p:nvGrpSpPr>
+          <p:cNvPr id="29" name="Group 28"/>
+          <p:cNvGrpSpPr/>
+          <p:nvPr/>
+        </p:nvGrpSpPr>
+        <p:grpSpPr>
+          <a:xfrm rot="16200000">
+            <a:off x="8847745" y="5468817"/>
+            <a:ext cx="457201" cy="457200"/>
+            <a:chOff x="2895599" y="5478834"/>
+            <a:chExt cx="457201" cy="457200"/>
+          </a:xfrm>
+        </p:grpSpPr>
+        <p:cxnSp>
+          <p:nvCxnSpPr>
+            <p:cNvPr id="30" name="Straight Arrow Connector 29"/>
+            <p:cNvCxnSpPr/>
+            <p:nvPr/>
+          </p:nvCxnSpPr>
+          <p:spPr>
+            <a:xfrm flipV="1">
+              <a:off x="2895600" y="5936034"/>
+              <a:ext cx="457200" cy="0"/>
+            </a:xfrm>
+            <a:prstGeom prst="straightConnector1">
+              <a:avLst/>
+            </a:prstGeom>
+            <a:ln w="38100">
+              <a:solidFill>
+                <a:srgbClr val="0000FF"/>
+              </a:solidFill>
+              <a:headEnd type="none" w="med" len="med"/>
+              <a:tailEnd type="arrow" w="med" len="med"/>
+            </a:ln>
+          </p:spPr>
+          <p:style>
+            <a:lnRef idx="1">
+              <a:schemeClr val="accent1"/>
+            </a:lnRef>
+            <a:fillRef idx="0">
+              <a:schemeClr val="accent1"/>
+            </a:fillRef>
+            <a:effectRef idx="0">
+              <a:schemeClr val="accent1"/>
+            </a:effectRef>
+            <a:fontRef idx="minor">
+              <a:schemeClr val="tx1"/>
+            </a:fontRef>
+          </p:style>
+        </p:cxnSp>
+        <p:cxnSp>
+          <p:nvCxnSpPr>
+            <p:cNvPr id="31" name="Straight Arrow Connector 30"/>
+            <p:cNvCxnSpPr/>
+            <p:nvPr/>
+          </p:nvCxnSpPr>
+          <p:spPr>
+            <a:xfrm flipH="1" flipV="1">
+              <a:off x="2895599" y="5478834"/>
+              <a:ext cx="0" cy="457200"/>
+            </a:xfrm>
+            <a:prstGeom prst="straightConnector1">
+              <a:avLst/>
+            </a:prstGeom>
+            <a:ln w="38100">
+              <a:solidFill>
+                <a:srgbClr val="FF0000"/>
+              </a:solidFill>
+              <a:headEnd type="none" w="med" len="med"/>
+              <a:tailEnd type="arrow" w="med" len="med"/>
+            </a:ln>
+          </p:spPr>
+          <p:style>
+            <a:lnRef idx="1">
+              <a:schemeClr val="accent1"/>
+            </a:lnRef>
+            <a:fillRef idx="0">
+              <a:schemeClr val="accent1"/>
+            </a:fillRef>
+            <a:effectRef idx="0">
+              <a:schemeClr val="accent1"/>
+            </a:effectRef>
+            <a:fontRef idx="minor">
+              <a:schemeClr val="tx1"/>
+            </a:fontRef>
+          </p:style>
+        </p:cxnSp>
+      </p:grpSp>
+      <mc:AlternateContent xmlns:mc="http://schemas.openxmlformats.org/markup-compatibility/2006" xmlns:a14="http://schemas.microsoft.com/office/drawing/2010/main">
+        <mc:Choice Requires="a14">
+          <p:sp>
+            <p:nvSpPr>
+              <p:cNvPr id="32" name="TextBox 31"/>
+              <p:cNvSpPr txBox="1"/>
+              <p:nvPr/>
+            </p:nvSpPr>
+            <p:spPr>
+              <a:xfrm>
+                <a:off x="2396762" y="1506022"/>
+                <a:ext cx="456482" cy="369332"/>
+              </a:xfrm>
+              <a:prstGeom prst="rect">
+                <a:avLst/>
+              </a:prstGeom>
+              <a:noFill/>
+            </p:spPr>
+            <p:txBody>
+              <a:bodyPr wrap="square" rtlCol="0">
+                <a:spAutoFit/>
+              </a:bodyPr>
+              <a:lstStyle/>
+              <a:p>
+                <a:pPr/>
+                <a14:m>
+                  <m:oMathPara xmlns:m="http://schemas.openxmlformats.org/officeDocument/2006/math">
+                    <m:oMathParaPr>
+                      <m:jc m:val="centerGroup"/>
+                    </m:oMathParaPr>
+                    <m:oMath xmlns:m="http://schemas.openxmlformats.org/officeDocument/2006/math">
+                      <m:sSub>
+                        <m:sSubPr>
+                          <m:ctrlPr>
+                            <a:rPr lang="en-US" b="0" i="1" smtClean="0">
+                              <a:latin typeface="Cambria Math" panose="02040503050406030204" pitchFamily="18" charset="0"/>
+                            </a:rPr>
+                          </m:ctrlPr>
+                        </m:sSubPr>
+                        <m:e>
+                          <m:r>
+                            <a:rPr lang="en-US" b="0" i="1" smtClean="0">
+                              <a:latin typeface="Cambria Math" panose="02040503050406030204" pitchFamily="18" charset="0"/>
+                            </a:rPr>
+                            <m:t>𝑜</m:t>
+                          </m:r>
+                        </m:e>
+                        <m:sub>
+                          <m:r>
+                            <a:rPr lang="en-US" b="0" i="1" smtClean="0">
+                              <a:latin typeface="Cambria Math" panose="02040503050406030204" pitchFamily="18" charset="0"/>
+                            </a:rPr>
+                            <m:t>𝑆𝐸</m:t>
+                          </m:r>
+                        </m:sub>
+                      </m:sSub>
+                    </m:oMath>
+                  </m:oMathPara>
+                </a14:m>
+                <a:endParaRPr lang="en-US" dirty="0"/>
+              </a:p>
+            </p:txBody>
+          </p:sp>
+        </mc:Choice>
+        <mc:Fallback xmlns="">
+          <p:sp>
+            <p:nvSpPr>
+              <p:cNvPr id="32" name="TextBox 31"/>
+              <p:cNvSpPr txBox="1">
+                <a:spLocks noRot="1" noChangeAspect="1" noMove="1" noResize="1" noEditPoints="1" noAdjustHandles="1" noChangeArrowheads="1" noChangeShapeType="1" noTextEdit="1"/>
+              </p:cNvSpPr>
+              <p:nvPr/>
+            </p:nvSpPr>
+            <p:spPr>
+              <a:xfrm>
+                <a:off x="2396762" y="1506022"/>
+                <a:ext cx="456482" cy="369332"/>
+              </a:xfrm>
+              <a:prstGeom prst="rect">
+                <a:avLst/>
+              </a:prstGeom>
+              <a:blipFill>
+                <a:blip r:embed="rId7"/>
+                <a:stretch>
+                  <a:fillRect r="-1333"/>
+                </a:stretch>
+              </a:blipFill>
+            </p:spPr>
+            <p:txBody>
+              <a:bodyPr/>
+              <a:lstStyle/>
+              <a:p>
+                <a:r>
+                  <a:rPr lang="en-US">
+                    <a:noFill/>
+                  </a:rPr>
+                  <a:t> </a:t>
+                </a:r>
+              </a:p>
+            </p:txBody>
+          </p:sp>
+        </mc:Fallback>
+      </mc:AlternateContent>
+      <mc:AlternateContent xmlns:mc="http://schemas.openxmlformats.org/markup-compatibility/2006" xmlns:a14="http://schemas.microsoft.com/office/drawing/2010/main">
+        <mc:Choice Requires="a14">
+          <p:sp>
+            <p:nvSpPr>
+              <p:cNvPr id="33" name="TextBox 32"/>
+              <p:cNvSpPr txBox="1"/>
+              <p:nvPr/>
+            </p:nvSpPr>
+            <p:spPr>
+              <a:xfrm>
+                <a:off x="9301048" y="1476731"/>
+                <a:ext cx="456482" cy="369332"/>
+              </a:xfrm>
+              <a:prstGeom prst="rect">
+                <a:avLst/>
+              </a:prstGeom>
+              <a:noFill/>
+            </p:spPr>
+            <p:txBody>
+              <a:bodyPr wrap="square" rtlCol="0">
+                <a:spAutoFit/>
+              </a:bodyPr>
+              <a:lstStyle/>
+              <a:p>
+                <a:pPr/>
+                <a14:m>
+                  <m:oMathPara xmlns:m="http://schemas.openxmlformats.org/officeDocument/2006/math">
+                    <m:oMathParaPr>
+                      <m:jc m:val="centerGroup"/>
+                    </m:oMathParaPr>
+                    <m:oMath xmlns:m="http://schemas.openxmlformats.org/officeDocument/2006/math">
+                      <m:sSub>
+                        <m:sSubPr>
+                          <m:ctrlPr>
+                            <a:rPr lang="en-US" b="0" i="1" smtClean="0">
+                              <a:latin typeface="Cambria Math" panose="02040503050406030204" pitchFamily="18" charset="0"/>
+                            </a:rPr>
+                          </m:ctrlPr>
+                        </m:sSubPr>
+                        <m:e>
+                          <m:r>
+                            <a:rPr lang="en-US" b="0" i="1" smtClean="0">
+                              <a:latin typeface="Cambria Math" panose="02040503050406030204" pitchFamily="18" charset="0"/>
+                            </a:rPr>
+                            <m:t>𝑜</m:t>
+                          </m:r>
+                        </m:e>
+                        <m:sub>
+                          <m:r>
+                            <a:rPr lang="en-US" b="0" i="1" smtClean="0">
+                              <a:latin typeface="Cambria Math" panose="02040503050406030204" pitchFamily="18" charset="0"/>
+                            </a:rPr>
+                            <m:t>𝑆𝑊</m:t>
+                          </m:r>
+                        </m:sub>
+                      </m:sSub>
+                    </m:oMath>
+                  </m:oMathPara>
+                </a14:m>
+                <a:endParaRPr lang="en-US" dirty="0"/>
+              </a:p>
+            </p:txBody>
+          </p:sp>
+        </mc:Choice>
+        <mc:Fallback xmlns="">
+          <p:sp>
+            <p:nvSpPr>
+              <p:cNvPr id="33" name="TextBox 32"/>
+              <p:cNvSpPr txBox="1">
+                <a:spLocks noRot="1" noChangeAspect="1" noMove="1" noResize="1" noEditPoints="1" noAdjustHandles="1" noChangeArrowheads="1" noChangeShapeType="1" noTextEdit="1"/>
+              </p:cNvSpPr>
+              <p:nvPr/>
+            </p:nvSpPr>
+            <p:spPr>
+              <a:xfrm>
+                <a:off x="9301048" y="1476731"/>
+                <a:ext cx="456482" cy="369332"/>
+              </a:xfrm>
+              <a:prstGeom prst="rect">
+                <a:avLst/>
+              </a:prstGeom>
+              <a:blipFill>
+                <a:blip r:embed="rId8"/>
+                <a:stretch>
+                  <a:fillRect r="-12000"/>
+                </a:stretch>
+              </a:blipFill>
+            </p:spPr>
+            <p:txBody>
+              <a:bodyPr/>
+              <a:lstStyle/>
+              <a:p>
+                <a:r>
+                  <a:rPr lang="en-US">
+                    <a:noFill/>
+                  </a:rPr>
+                  <a:t> </a:t>
+                </a:r>
+              </a:p>
+            </p:txBody>
+          </p:sp>
+        </mc:Fallback>
+      </mc:AlternateContent>
+      <mc:AlternateContent xmlns:mc="http://schemas.openxmlformats.org/markup-compatibility/2006" xmlns:a14="http://schemas.microsoft.com/office/drawing/2010/main">
+        <mc:Choice Requires="a14">
+          <p:sp>
+            <p:nvSpPr>
+              <p:cNvPr id="34" name="TextBox 33"/>
+              <p:cNvSpPr txBox="1"/>
+              <p:nvPr/>
+            </p:nvSpPr>
+            <p:spPr>
+              <a:xfrm>
+                <a:off x="9338756" y="5707434"/>
+                <a:ext cx="456482" cy="369332"/>
+              </a:xfrm>
+              <a:prstGeom prst="rect">
+                <a:avLst/>
+              </a:prstGeom>
+              <a:noFill/>
+            </p:spPr>
+            <p:txBody>
+              <a:bodyPr wrap="square" rtlCol="0">
+                <a:spAutoFit/>
+              </a:bodyPr>
+              <a:lstStyle/>
+              <a:p>
+                <a:pPr/>
+                <a14:m>
+                  <m:oMathPara xmlns:m="http://schemas.openxmlformats.org/officeDocument/2006/math">
+                    <m:oMathParaPr>
+                      <m:jc m:val="centerGroup"/>
+                    </m:oMathParaPr>
+                    <m:oMath xmlns:m="http://schemas.openxmlformats.org/officeDocument/2006/math">
+                      <m:sSub>
+                        <m:sSubPr>
+                          <m:ctrlPr>
+                            <a:rPr lang="en-US" b="0" i="1" smtClean="0">
+                              <a:latin typeface="Cambria Math" panose="02040503050406030204" pitchFamily="18" charset="0"/>
+                            </a:rPr>
+                          </m:ctrlPr>
+                        </m:sSubPr>
+                        <m:e>
+                          <m:r>
+                            <a:rPr lang="en-US" b="0" i="1" smtClean="0">
+                              <a:latin typeface="Cambria Math" panose="02040503050406030204" pitchFamily="18" charset="0"/>
+                            </a:rPr>
+                            <m:t>𝑜</m:t>
+                          </m:r>
+                        </m:e>
+                        <m:sub>
+                          <m:r>
+                            <a:rPr lang="en-US" b="0" i="1" smtClean="0">
+                              <a:latin typeface="Cambria Math" panose="02040503050406030204" pitchFamily="18" charset="0"/>
+                            </a:rPr>
+                            <m:t>𝑁𝑊</m:t>
+                          </m:r>
+                        </m:sub>
+                      </m:sSub>
+                    </m:oMath>
+                  </m:oMathPara>
+                </a14:m>
+                <a:endParaRPr lang="en-US" dirty="0"/>
+              </a:p>
+            </p:txBody>
+          </p:sp>
+        </mc:Choice>
+        <mc:Fallback xmlns="">
+          <p:sp>
+            <p:nvSpPr>
+              <p:cNvPr id="34" name="TextBox 33"/>
+              <p:cNvSpPr txBox="1">
+                <a:spLocks noRot="1" noChangeAspect="1" noMove="1" noResize="1" noEditPoints="1" noAdjustHandles="1" noChangeArrowheads="1" noChangeShapeType="1" noTextEdit="1"/>
+              </p:cNvSpPr>
+              <p:nvPr/>
+            </p:nvSpPr>
+            <p:spPr>
+              <a:xfrm>
+                <a:off x="9338756" y="5707434"/>
+                <a:ext cx="456482" cy="369332"/>
+              </a:xfrm>
+              <a:prstGeom prst="rect">
+                <a:avLst/>
+              </a:prstGeom>
+              <a:blipFill>
+                <a:blip r:embed="rId9"/>
+                <a:stretch>
+                  <a:fillRect r="-21333"/>
+                </a:stretch>
+              </a:blipFill>
+            </p:spPr>
+            <p:txBody>
+              <a:bodyPr/>
+              <a:lstStyle/>
+              <a:p>
+                <a:r>
+                  <a:rPr lang="en-US">
+                    <a:noFill/>
+                  </a:rPr>
+                  <a:t> </a:t>
+                </a:r>
+              </a:p>
+            </p:txBody>
+          </p:sp>
+        </mc:Fallback>
+      </mc:AlternateContent>
+      <p:cxnSp>
+        <p:nvCxnSpPr>
+          <p:cNvPr id="35" name="Straight Connector 34"/>
+          <p:cNvCxnSpPr/>
+          <p:nvPr/>
+        </p:nvCxnSpPr>
+        <p:spPr>
+          <a:xfrm>
+            <a:off x="2888392" y="6185821"/>
+            <a:ext cx="0" cy="640080"/>
+          </a:xfrm>
+          <a:prstGeom prst="line">
+            <a:avLst/>
+          </a:prstGeom>
+          <a:ln w="28575">
+            <a:solidFill>
+              <a:schemeClr val="tx1"/>
+            </a:solidFill>
+          </a:ln>
+        </p:spPr>
+        <p:style>
+          <a:lnRef idx="1">
+            <a:schemeClr val="dk1"/>
+          </a:lnRef>
+          <a:fillRef idx="0">
+            <a:schemeClr val="dk1"/>
+          </a:fillRef>
+          <a:effectRef idx="0">
+            <a:schemeClr val="dk1"/>
+          </a:effectRef>
+          <a:fontRef idx="minor">
+            <a:schemeClr val="tx1"/>
+          </a:fontRef>
+        </p:style>
+      </p:cxnSp>
+      <p:cxnSp>
+        <p:nvCxnSpPr>
+          <p:cNvPr id="36" name="Straight Connector 35"/>
+          <p:cNvCxnSpPr/>
+          <p:nvPr/>
+        </p:nvCxnSpPr>
+        <p:spPr>
+          <a:xfrm>
+            <a:off x="9289192" y="6185821"/>
+            <a:ext cx="0" cy="640080"/>
+          </a:xfrm>
+          <a:prstGeom prst="line">
+            <a:avLst/>
+          </a:prstGeom>
+          <a:ln w="28575">
+            <a:solidFill>
+              <a:schemeClr val="tx1"/>
+            </a:solidFill>
+          </a:ln>
+        </p:spPr>
+        <p:style>
+          <a:lnRef idx="1">
+            <a:schemeClr val="dk1"/>
+          </a:lnRef>
+          <a:fillRef idx="0">
+            <a:schemeClr val="dk1"/>
+          </a:fillRef>
+          <a:effectRef idx="0">
+            <a:schemeClr val="dk1"/>
+          </a:effectRef>
+          <a:fontRef idx="minor">
+            <a:schemeClr val="tx1"/>
+          </a:fontRef>
+        </p:style>
+      </p:cxnSp>
+      <p:cxnSp>
+        <p:nvCxnSpPr>
+          <p:cNvPr id="37" name="Straight Arrow Connector 36"/>
+          <p:cNvCxnSpPr/>
+          <p:nvPr/>
+        </p:nvCxnSpPr>
+        <p:spPr>
+          <a:xfrm>
+            <a:off x="2888392" y="6505861"/>
+            <a:ext cx="6400800" cy="0"/>
+          </a:xfrm>
+          <a:prstGeom prst="straightConnector1">
+            <a:avLst/>
+          </a:prstGeom>
+          <a:ln w="28575">
+            <a:solidFill>
+              <a:schemeClr val="tx1"/>
+            </a:solidFill>
+            <a:headEnd type="arrow" w="med" len="med"/>
+            <a:tailEnd type="arrow" w="med" len="med"/>
+          </a:ln>
+        </p:spPr>
+        <p:style>
+          <a:lnRef idx="1">
+            <a:schemeClr val="accent1"/>
+          </a:lnRef>
+          <a:fillRef idx="0">
+            <a:schemeClr val="accent1"/>
+          </a:fillRef>
+          <a:effectRef idx="0">
+            <a:schemeClr val="accent1"/>
+          </a:effectRef>
+          <a:fontRef idx="minor">
+            <a:schemeClr val="tx1"/>
+          </a:fontRef>
+        </p:style>
+      </p:cxnSp>
+      <p:sp>
+        <p:nvSpPr>
+          <p:cNvPr id="38" name="TextBox 37"/>
+          <p:cNvSpPr txBox="1"/>
+          <p:nvPr/>
+        </p:nvSpPr>
+        <p:spPr>
+          <a:xfrm>
+            <a:off x="5676788" y="6321195"/>
+            <a:ext cx="824008" cy="369332"/>
+          </a:xfrm>
+          <a:prstGeom prst="rect">
+            <a:avLst/>
+          </a:prstGeom>
+          <a:solidFill>
+            <a:schemeClr val="bg1"/>
+          </a:solidFill>
+        </p:spPr>
+        <p:txBody>
+          <a:bodyPr wrap="none" rtlCol="0">
+            <a:spAutoFit/>
+          </a:bodyPr>
+          <a:lstStyle/>
+          <a:p>
+            <a:r>
+              <a:rPr lang="en-US" u="sng" dirty="0" smtClean="0"/>
+              <a:t>Length</a:t>
+            </a:r>
+            <a:endParaRPr lang="en-US" u="sng" dirty="0"/>
+          </a:p>
+        </p:txBody>
+      </p:sp>
+      <p:cxnSp>
+        <p:nvCxnSpPr>
+          <p:cNvPr id="39" name="Straight Connector 38"/>
+          <p:cNvCxnSpPr/>
+          <p:nvPr/>
+        </p:nvCxnSpPr>
+        <p:spPr>
+          <a:xfrm rot="16200000">
+            <a:off x="1840872" y="1491669"/>
+            <a:ext cx="0" cy="640080"/>
+          </a:xfrm>
+          <a:prstGeom prst="line">
+            <a:avLst/>
+          </a:prstGeom>
+          <a:ln w="28575">
+            <a:solidFill>
+              <a:schemeClr val="tx1"/>
+            </a:solidFill>
+          </a:ln>
+        </p:spPr>
+        <p:style>
+          <a:lnRef idx="1">
+            <a:schemeClr val="dk1"/>
+          </a:lnRef>
+          <a:fillRef idx="0">
+            <a:schemeClr val="dk1"/>
+          </a:fillRef>
+          <a:effectRef idx="0">
+            <a:schemeClr val="dk1"/>
+          </a:effectRef>
+          <a:fontRef idx="minor">
+            <a:schemeClr val="tx1"/>
+          </a:fontRef>
+        </p:style>
+      </p:cxnSp>
+      <p:cxnSp>
+        <p:nvCxnSpPr>
+          <p:cNvPr id="40" name="Straight Connector 39"/>
+          <p:cNvCxnSpPr/>
+          <p:nvPr/>
+        </p:nvCxnSpPr>
+        <p:spPr>
+          <a:xfrm rot="16200000">
+            <a:off x="1850397" y="5587419"/>
+            <a:ext cx="0" cy="640080"/>
+          </a:xfrm>
+          <a:prstGeom prst="line">
+            <a:avLst/>
+          </a:prstGeom>
+          <a:ln w="28575">
+            <a:solidFill>
+              <a:schemeClr val="tx1"/>
+            </a:solidFill>
+          </a:ln>
+        </p:spPr>
+        <p:style>
+          <a:lnRef idx="1">
+            <a:schemeClr val="dk1"/>
+          </a:lnRef>
+          <a:fillRef idx="0">
+            <a:schemeClr val="dk1"/>
+          </a:fillRef>
+          <a:effectRef idx="0">
+            <a:schemeClr val="dk1"/>
+          </a:effectRef>
+          <a:fontRef idx="minor">
+            <a:schemeClr val="tx1"/>
+          </a:fontRef>
+        </p:style>
+      </p:cxnSp>
+      <p:cxnSp>
+        <p:nvCxnSpPr>
+          <p:cNvPr id="41" name="Straight Arrow Connector 40"/>
+          <p:cNvCxnSpPr/>
+          <p:nvPr/>
+        </p:nvCxnSpPr>
+        <p:spPr>
+          <a:xfrm rot="16200000">
+            <a:off x="-172713" y="3851963"/>
+            <a:ext cx="4023360" cy="0"/>
+          </a:xfrm>
+          <a:prstGeom prst="straightConnector1">
+            <a:avLst/>
+          </a:prstGeom>
+          <a:ln w="28575">
+            <a:solidFill>
+              <a:schemeClr val="tx1"/>
+            </a:solidFill>
+            <a:headEnd type="arrow" w="med" len="med"/>
+            <a:tailEnd type="arrow" w="med" len="med"/>
+          </a:ln>
+        </p:spPr>
+        <p:style>
+          <a:lnRef idx="1">
+            <a:schemeClr val="accent1"/>
+          </a:lnRef>
+          <a:fillRef idx="0">
+            <a:schemeClr val="accent1"/>
+          </a:fillRef>
+          <a:effectRef idx="0">
+            <a:schemeClr val="accent1"/>
+          </a:effectRef>
+          <a:fontRef idx="minor">
+            <a:schemeClr val="tx1"/>
+          </a:fontRef>
+        </p:style>
+      </p:cxnSp>
+      <p:sp>
+        <p:nvSpPr>
+          <p:cNvPr id="42" name="TextBox 41"/>
+          <p:cNvSpPr txBox="1"/>
+          <p:nvPr/>
+        </p:nvSpPr>
+        <p:spPr>
+          <a:xfrm rot="16200000">
+            <a:off x="1468722" y="3553896"/>
+            <a:ext cx="763351" cy="369332"/>
+          </a:xfrm>
+          <a:prstGeom prst="rect">
+            <a:avLst/>
+          </a:prstGeom>
+          <a:solidFill>
+            <a:schemeClr val="bg1"/>
+          </a:solidFill>
+        </p:spPr>
+        <p:txBody>
+          <a:bodyPr wrap="none" rtlCol="0">
+            <a:spAutoFit/>
+          </a:bodyPr>
+          <a:lstStyle/>
+          <a:p>
+            <a:r>
+              <a:rPr lang="en-US" u="sng" dirty="0" smtClean="0"/>
+              <a:t>Width</a:t>
+            </a:r>
+            <a:endParaRPr lang="en-US" u="sng" dirty="0"/>
+          </a:p>
+        </p:txBody>
+      </p:sp>
+      <p:sp>
+        <p:nvSpPr>
+          <p:cNvPr id="11" name="TextBox 10"/>
+          <p:cNvSpPr txBox="1"/>
+          <p:nvPr/>
+        </p:nvSpPr>
+        <p:spPr>
+          <a:xfrm>
+            <a:off x="2146009" y="1246996"/>
+            <a:ext cx="301686" cy="369332"/>
+          </a:xfrm>
+          <a:prstGeom prst="rect">
+            <a:avLst/>
+          </a:prstGeom>
+          <a:noFill/>
+        </p:spPr>
+        <p:txBody>
+          <a:bodyPr wrap="none" rtlCol="0">
+            <a:spAutoFit/>
+          </a:bodyPr>
+          <a:lstStyle/>
+          <a:p>
+            <a:r>
+              <a:rPr lang="en-US" dirty="0" smtClean="0"/>
+              <a:t>2</a:t>
+            </a:r>
+            <a:endParaRPr lang="en-US" dirty="0"/>
+          </a:p>
+        </p:txBody>
+      </p:sp>
+      <p:sp>
+        <p:nvSpPr>
+          <p:cNvPr id="43" name="TextBox 42"/>
+          <p:cNvSpPr txBox="1"/>
+          <p:nvPr/>
+        </p:nvSpPr>
+        <p:spPr>
+          <a:xfrm>
+            <a:off x="10125342" y="1366778"/>
+            <a:ext cx="301686" cy="369332"/>
+          </a:xfrm>
+          <a:prstGeom prst="rect">
+            <a:avLst/>
+          </a:prstGeom>
+          <a:noFill/>
+        </p:spPr>
+        <p:txBody>
+          <a:bodyPr wrap="none" rtlCol="0">
+            <a:spAutoFit/>
+          </a:bodyPr>
+          <a:lstStyle/>
+          <a:p>
+            <a:r>
+              <a:rPr lang="en-US" dirty="0" smtClean="0"/>
+              <a:t>1</a:t>
+            </a:r>
+            <a:endParaRPr lang="en-US" dirty="0"/>
+          </a:p>
+        </p:txBody>
+      </p:sp>
+      <p:sp>
+        <p:nvSpPr>
+          <p:cNvPr id="44" name="TextBox 43"/>
+          <p:cNvSpPr txBox="1"/>
+          <p:nvPr/>
+        </p:nvSpPr>
+        <p:spPr>
+          <a:xfrm>
+            <a:off x="2292038" y="6198113"/>
+            <a:ext cx="301686" cy="369332"/>
+          </a:xfrm>
+          <a:prstGeom prst="rect">
+            <a:avLst/>
+          </a:prstGeom>
+          <a:noFill/>
+        </p:spPr>
+        <p:txBody>
+          <a:bodyPr wrap="none" rtlCol="0">
+            <a:spAutoFit/>
+          </a:bodyPr>
+          <a:lstStyle/>
+          <a:p>
+            <a:r>
+              <a:rPr lang="en-US" dirty="0" smtClean="0"/>
+              <a:t>3</a:t>
+            </a:r>
+            <a:endParaRPr lang="en-US" dirty="0"/>
+          </a:p>
+        </p:txBody>
+      </p:sp>
+      <p:sp>
+        <p:nvSpPr>
+          <p:cNvPr id="45" name="TextBox 44"/>
+          <p:cNvSpPr txBox="1"/>
+          <p:nvPr/>
+        </p:nvSpPr>
+        <p:spPr>
+          <a:xfrm>
+            <a:off x="9823656" y="6084482"/>
+            <a:ext cx="301686" cy="369332"/>
+          </a:xfrm>
+          <a:prstGeom prst="rect">
+            <a:avLst/>
+          </a:prstGeom>
+          <a:noFill/>
+        </p:spPr>
+        <p:txBody>
+          <a:bodyPr wrap="none" rtlCol="0">
+            <a:spAutoFit/>
+          </a:bodyPr>
+          <a:lstStyle/>
+          <a:p>
+            <a:r>
+              <a:rPr lang="en-US" smtClean="0"/>
+              <a:t>4</a:t>
+            </a:r>
+            <a:endParaRPr lang="en-US" dirty="0"/>
+          </a:p>
+        </p:txBody>
+      </p:sp>
+      <p:grpSp>
+        <p:nvGrpSpPr>
+          <p:cNvPr id="56" name="Group 55"/>
+          <p:cNvGrpSpPr/>
+          <p:nvPr/>
+        </p:nvGrpSpPr>
+        <p:grpSpPr>
+          <a:xfrm>
+            <a:off x="6004560" y="3121741"/>
+            <a:ext cx="182880" cy="1501873"/>
+            <a:chOff x="5910030" y="3121741"/>
+            <a:chExt cx="182880" cy="1501873"/>
+          </a:xfrm>
+        </p:grpSpPr>
+        <p:sp>
+          <p:nvSpPr>
+            <p:cNvPr id="49" name="Oval 48"/>
+            <p:cNvSpPr/>
+            <p:nvPr/>
+          </p:nvSpPr>
+          <p:spPr>
+            <a:xfrm>
+              <a:off x="5910030" y="3121741"/>
+              <a:ext cx="182880" cy="182880"/>
+            </a:xfrm>
+            <a:prstGeom prst="ellipse">
+              <a:avLst/>
+            </a:prstGeom>
+            <a:solidFill>
+              <a:schemeClr val="bg1"/>
+            </a:solidFill>
+          </p:spPr>
+          <p:style>
+            <a:lnRef idx="2">
+              <a:schemeClr val="accent1">
+                <a:shade val="50000"/>
+              </a:schemeClr>
+            </a:lnRef>
+            <a:fillRef idx="1">
+              <a:schemeClr val="accent1"/>
+            </a:fillRef>
+            <a:effectRef idx="0">
+              <a:schemeClr val="accent1"/>
+            </a:effectRef>
+            <a:fontRef idx="minor">
+              <a:schemeClr val="lt1"/>
+            </a:fontRef>
+          </p:style>
+          <p:txBody>
+            <a:bodyPr rtlCol="0" anchor="ctr"/>
+            <a:lstStyle/>
+            <a:p>
+              <a:pPr algn="ctr"/>
+              <a:endParaRPr lang="en-US"/>
+            </a:p>
+          </p:txBody>
+        </p:sp>
+        <p:sp>
+          <p:nvSpPr>
+            <p:cNvPr id="51" name="Oval 50"/>
+            <p:cNvSpPr/>
+            <p:nvPr/>
+          </p:nvSpPr>
+          <p:spPr>
+            <a:xfrm>
+              <a:off x="5910030" y="4440734"/>
+              <a:ext cx="182880" cy="182880"/>
+            </a:xfrm>
+            <a:prstGeom prst="ellipse">
+              <a:avLst/>
+            </a:prstGeom>
+            <a:solidFill>
+              <a:schemeClr val="bg1"/>
+            </a:solidFill>
+          </p:spPr>
+          <p:style>
+            <a:lnRef idx="2">
+              <a:schemeClr val="accent1">
+                <a:shade val="50000"/>
+              </a:schemeClr>
+            </a:lnRef>
+            <a:fillRef idx="1">
+              <a:schemeClr val="accent1"/>
+            </a:fillRef>
+            <a:effectRef idx="0">
+              <a:schemeClr val="accent1"/>
+            </a:effectRef>
+            <a:fontRef idx="minor">
+              <a:schemeClr val="lt1"/>
+            </a:fontRef>
+          </p:style>
+          <p:txBody>
+            <a:bodyPr rtlCol="0" anchor="ctr"/>
+            <a:lstStyle/>
+            <a:p>
+              <a:pPr algn="ctr"/>
+              <a:endParaRPr lang="en-US"/>
+            </a:p>
+          </p:txBody>
+        </p:sp>
+      </p:grpSp>
+      <p:grpSp>
+        <p:nvGrpSpPr>
+          <p:cNvPr id="58" name="Group 57"/>
+          <p:cNvGrpSpPr/>
+          <p:nvPr/>
+        </p:nvGrpSpPr>
+        <p:grpSpPr>
+          <a:xfrm>
+            <a:off x="8102515" y="2505215"/>
+            <a:ext cx="182880" cy="2672653"/>
+            <a:chOff x="5910030" y="2506440"/>
+            <a:chExt cx="182880" cy="2672653"/>
+          </a:xfrm>
+        </p:grpSpPr>
+        <p:sp>
+          <p:nvSpPr>
+            <p:cNvPr id="59" name="Oval 58"/>
+            <p:cNvSpPr/>
+            <p:nvPr/>
+          </p:nvSpPr>
+          <p:spPr>
+            <a:xfrm>
+              <a:off x="5910030" y="2506440"/>
+              <a:ext cx="182880" cy="182880"/>
+            </a:xfrm>
+            <a:prstGeom prst="ellipse">
+              <a:avLst/>
+            </a:prstGeom>
+            <a:solidFill>
+              <a:schemeClr val="bg1"/>
+            </a:solidFill>
+          </p:spPr>
+          <p:style>
+            <a:lnRef idx="2">
+              <a:schemeClr val="accent1">
+                <a:shade val="50000"/>
+              </a:schemeClr>
+            </a:lnRef>
+            <a:fillRef idx="1">
+              <a:schemeClr val="accent1"/>
+            </a:fillRef>
+            <a:effectRef idx="0">
+              <a:schemeClr val="accent1"/>
+            </a:effectRef>
+            <a:fontRef idx="minor">
+              <a:schemeClr val="lt1"/>
+            </a:fontRef>
+          </p:style>
+          <p:txBody>
+            <a:bodyPr rtlCol="0" anchor="ctr"/>
+            <a:lstStyle/>
+            <a:p>
+              <a:pPr algn="ctr"/>
+              <a:endParaRPr lang="en-US"/>
+            </a:p>
+          </p:txBody>
+        </p:sp>
+        <p:sp>
+          <p:nvSpPr>
+            <p:cNvPr id="60" name="Oval 59"/>
+            <p:cNvSpPr/>
+            <p:nvPr/>
+          </p:nvSpPr>
+          <p:spPr>
+            <a:xfrm>
+              <a:off x="5910030" y="3751327"/>
+              <a:ext cx="182880" cy="182880"/>
+            </a:xfrm>
+            <a:prstGeom prst="ellipse">
+              <a:avLst/>
+            </a:prstGeom>
+            <a:solidFill>
+              <a:schemeClr val="bg1"/>
+            </a:solidFill>
+          </p:spPr>
+          <p:style>
+            <a:lnRef idx="2">
+              <a:schemeClr val="accent1">
+                <a:shade val="50000"/>
+              </a:schemeClr>
+            </a:lnRef>
+            <a:fillRef idx="1">
+              <a:schemeClr val="accent1"/>
+            </a:fillRef>
+            <a:effectRef idx="0">
+              <a:schemeClr val="accent1"/>
+            </a:effectRef>
+            <a:fontRef idx="minor">
+              <a:schemeClr val="lt1"/>
+            </a:fontRef>
+          </p:style>
+          <p:txBody>
+            <a:bodyPr rtlCol="0" anchor="ctr"/>
+            <a:lstStyle/>
+            <a:p>
+              <a:pPr algn="ctr"/>
+              <a:endParaRPr lang="en-US"/>
+            </a:p>
+          </p:txBody>
+        </p:sp>
+        <p:sp>
+          <p:nvSpPr>
+            <p:cNvPr id="61" name="Oval 60"/>
+            <p:cNvSpPr/>
+            <p:nvPr/>
+          </p:nvSpPr>
+          <p:spPr>
+            <a:xfrm>
+              <a:off x="5910030" y="4996213"/>
+              <a:ext cx="182880" cy="182880"/>
+            </a:xfrm>
+            <a:prstGeom prst="ellipse">
+              <a:avLst/>
+            </a:prstGeom>
+            <a:solidFill>
+              <a:schemeClr val="bg1"/>
+            </a:solidFill>
+          </p:spPr>
+          <p:style>
+            <a:lnRef idx="2">
+              <a:schemeClr val="accent1">
+                <a:shade val="50000"/>
+              </a:schemeClr>
+            </a:lnRef>
+            <a:fillRef idx="1">
+              <a:schemeClr val="accent1"/>
+            </a:fillRef>
+            <a:effectRef idx="0">
+              <a:schemeClr val="accent1"/>
+            </a:effectRef>
+            <a:fontRef idx="minor">
+              <a:schemeClr val="lt1"/>
+            </a:fontRef>
+          </p:style>
+          <p:txBody>
+            <a:bodyPr rtlCol="0" anchor="ctr"/>
+            <a:lstStyle/>
+            <a:p>
+              <a:pPr algn="ctr"/>
+              <a:endParaRPr lang="en-US"/>
+            </a:p>
+          </p:txBody>
+        </p:sp>
+      </p:grpSp>
+      <p:grpSp>
+        <p:nvGrpSpPr>
+          <p:cNvPr id="63" name="Group 62"/>
+          <p:cNvGrpSpPr/>
+          <p:nvPr/>
+        </p:nvGrpSpPr>
+        <p:grpSpPr>
+          <a:xfrm>
+            <a:off x="3906605" y="2505215"/>
+            <a:ext cx="182880" cy="2672653"/>
+            <a:chOff x="5910030" y="2506440"/>
+            <a:chExt cx="182880" cy="2672653"/>
+          </a:xfrm>
+        </p:grpSpPr>
+        <p:sp>
+          <p:nvSpPr>
+            <p:cNvPr id="64" name="Oval 63"/>
+            <p:cNvSpPr/>
+            <p:nvPr/>
+          </p:nvSpPr>
+          <p:spPr>
+            <a:xfrm>
+              <a:off x="5910030" y="2506440"/>
+              <a:ext cx="182880" cy="182880"/>
+            </a:xfrm>
+            <a:prstGeom prst="ellipse">
+              <a:avLst/>
+            </a:prstGeom>
+            <a:solidFill>
+              <a:schemeClr val="bg1"/>
+            </a:solidFill>
+          </p:spPr>
+          <p:style>
+            <a:lnRef idx="2">
+              <a:schemeClr val="accent1">
+                <a:shade val="50000"/>
+              </a:schemeClr>
+            </a:lnRef>
+            <a:fillRef idx="1">
+              <a:schemeClr val="accent1"/>
+            </a:fillRef>
+            <a:effectRef idx="0">
+              <a:schemeClr val="accent1"/>
+            </a:effectRef>
+            <a:fontRef idx="minor">
+              <a:schemeClr val="lt1"/>
+            </a:fontRef>
+          </p:style>
+          <p:txBody>
+            <a:bodyPr rtlCol="0" anchor="ctr"/>
+            <a:lstStyle/>
+            <a:p>
+              <a:pPr algn="ctr"/>
+              <a:endParaRPr lang="en-US"/>
+            </a:p>
+          </p:txBody>
+        </p:sp>
+        <p:sp>
+          <p:nvSpPr>
+            <p:cNvPr id="65" name="Oval 64"/>
+            <p:cNvSpPr/>
+            <p:nvPr/>
+          </p:nvSpPr>
+          <p:spPr>
+            <a:xfrm>
+              <a:off x="5910030" y="3751327"/>
+              <a:ext cx="182880" cy="182880"/>
+            </a:xfrm>
+            <a:prstGeom prst="ellipse">
+              <a:avLst/>
+            </a:prstGeom>
+            <a:solidFill>
+              <a:schemeClr val="bg1"/>
+            </a:solidFill>
+          </p:spPr>
+          <p:style>
+            <a:lnRef idx="2">
+              <a:schemeClr val="accent1">
+                <a:shade val="50000"/>
+              </a:schemeClr>
+            </a:lnRef>
+            <a:fillRef idx="1">
+              <a:schemeClr val="accent1"/>
+            </a:fillRef>
+            <a:effectRef idx="0">
+              <a:schemeClr val="accent1"/>
+            </a:effectRef>
+            <a:fontRef idx="minor">
+              <a:schemeClr val="lt1"/>
+            </a:fontRef>
+          </p:style>
+          <p:txBody>
+            <a:bodyPr rtlCol="0" anchor="ctr"/>
+            <a:lstStyle/>
+            <a:p>
+              <a:pPr algn="ctr"/>
+              <a:endParaRPr lang="en-US"/>
+            </a:p>
+          </p:txBody>
+        </p:sp>
+        <p:sp>
+          <p:nvSpPr>
+            <p:cNvPr id="66" name="Oval 65"/>
+            <p:cNvSpPr/>
+            <p:nvPr/>
+          </p:nvSpPr>
+          <p:spPr>
+            <a:xfrm>
+              <a:off x="5910030" y="4996213"/>
+              <a:ext cx="182880" cy="182880"/>
+            </a:xfrm>
+            <a:prstGeom prst="ellipse">
+              <a:avLst/>
+            </a:prstGeom>
+            <a:solidFill>
+              <a:schemeClr val="bg1"/>
+            </a:solidFill>
+          </p:spPr>
+          <p:style>
+            <a:lnRef idx="2">
+              <a:schemeClr val="accent1">
+                <a:shade val="50000"/>
+              </a:schemeClr>
+            </a:lnRef>
+            <a:fillRef idx="1">
+              <a:schemeClr val="accent1"/>
+            </a:fillRef>
+            <a:effectRef idx="0">
+              <a:schemeClr val="accent1"/>
+            </a:effectRef>
+            <a:fontRef idx="minor">
+              <a:schemeClr val="lt1"/>
+            </a:fontRef>
+          </p:style>
+          <p:txBody>
+            <a:bodyPr rtlCol="0" anchor="ctr"/>
+            <a:lstStyle/>
+            <a:p>
+              <a:pPr algn="ctr"/>
+              <a:endParaRPr lang="en-US"/>
+            </a:p>
+          </p:txBody>
+        </p:sp>
+      </p:grpSp>
+    </p:spTree>
+    <p:extLst>
+      <p:ext uri="{BB962C8B-B14F-4D97-AF65-F5344CB8AC3E}">
+        <p14:creationId xmlns:p14="http://schemas.microsoft.com/office/powerpoint/2010/main" val="3884352366"/>
+      </p:ext>
+    </p:extLst>
+  </p:cSld>
+  <p:clrMapOvr>
+    <a:masterClrMapping/>
+  </p:clrMapOvr>
+</p:sld>
+</file>
+
 <file path=ppt/theme/theme1.xml><?xml version="1.0" encoding="utf-8"?>
 <a:theme xmlns:a="http://schemas.openxmlformats.org/drawingml/2006/main" name="Office Theme">
   <a:themeElements>

</xml_diff>